<commit_message>
refactor of the directory, added birealnet
</commit_message>
<xml_diff>
--- a/zoo_qkeras_vs_larq.pptx
+++ b/zoo_qkeras_vs_larq.pptx
@@ -241,7 +241,7 @@
               <a:rPr lang="fr-FR" smtClean="0">
                 <a:latin typeface="Arial" panose="020B0604020202020204" pitchFamily="34" charset="0"/>
               </a:rPr>
-              <a:t>18/03/2021</a:t>
+              <a:t>23/03/2021</a:t>
             </a:fld>
             <a:endParaRPr lang="fr-FR" dirty="0">
               <a:latin typeface="Arial" panose="020B0604020202020204" pitchFamily="34" charset="0"/>
@@ -431,7 +431,7 @@
             <a:fld id="{71C683A4-DA5F-4AC0-B623-C481774958C7}" type="datetimeFigureOut">
               <a:rPr lang="fr-FR" smtClean="0"/>
               <a:pPr/>
-              <a:t>18/03/2021</a:t>
+              <a:t>23/03/2021</a:t>
             </a:fld>
             <a:endParaRPr lang="fr-FR" dirty="0"/>
           </a:p>
@@ -1978,7 +1978,7 @@
           <a:p>
             <a:fld id="{1B5AEA7E-51B5-4CB2-80D5-15820A17CAE3}" type="datetime5">
               <a:rPr lang="en-US" smtClean="0"/>
-              <a:t>18-Mar-21</a:t>
+              <a:t>23-Mar-21</a:t>
             </a:fld>
             <a:endParaRPr lang="fr-FR"/>
           </a:p>
@@ -2562,7 +2562,7 @@
           <a:p>
             <a:fld id="{6CAAEE57-6C7A-4485-90B9-68FD3C018D4D}" type="datetime5">
               <a:rPr lang="en-US" smtClean="0"/>
-              <a:t>18-Mar-21</a:t>
+              <a:t>23-Mar-21</a:t>
             </a:fld>
             <a:endParaRPr lang="fr-FR" dirty="0"/>
           </a:p>
@@ -2732,7 +2732,7 @@
           <a:p>
             <a:fld id="{96EB4663-F7A4-4D1C-A9ED-CB0F8B6C7043}" type="datetime5">
               <a:rPr lang="en-US" smtClean="0"/>
-              <a:t>18-Mar-21</a:t>
+              <a:t>23-Mar-21</a:t>
             </a:fld>
             <a:endParaRPr lang="fr-FR" dirty="0"/>
           </a:p>
@@ -2881,7 +2881,7 @@
           <a:p>
             <a:fld id="{6BA86AAF-A50C-4368-8908-D3A4D71BEB6A}" type="datetime5">
               <a:rPr lang="en-US" smtClean="0"/>
-              <a:t>18-Mar-21</a:t>
+              <a:t>23-Mar-21</a:t>
             </a:fld>
             <a:endParaRPr lang="fr-FR" dirty="0"/>
           </a:p>
@@ -3651,7 +3651,7 @@
           <a:p>
             <a:fld id="{49D6B855-A76D-4459-A823-EF680B29CDD3}" type="datetime5">
               <a:rPr lang="en-US" smtClean="0"/>
-              <a:t>18-Mar-21</a:t>
+              <a:t>23-Mar-21</a:t>
             </a:fld>
             <a:endParaRPr lang="fr-FR" dirty="0"/>
           </a:p>
@@ -6195,38 +6195,38 @@
           <a:p>
             <a:pPr lvl="2"/>
             <a:r>
-              <a:rPr lang="it-IT" sz="1200" dirty="0" err="1"/>
+              <a:rPr lang="it-IT" sz="1100" dirty="0" err="1"/>
               <a:t>https</a:t>
             </a:r>
             <a:r>
-              <a:rPr lang="it-IT" sz="1200" dirty="0"/>
+              <a:rPr lang="it-IT" sz="1100" dirty="0"/>
               <a:t>://</a:t>
             </a:r>
             <a:r>
-              <a:rPr lang="it-IT" sz="1200" dirty="0" err="1"/>
+              <a:rPr lang="it-IT" sz="1100" dirty="0" err="1"/>
               <a:t>github.com</a:t>
             </a:r>
             <a:r>
-              <a:rPr lang="it-IT" sz="1200" dirty="0"/>
+              <a:rPr lang="it-IT" sz="1100" dirty="0"/>
               <a:t>/</a:t>
             </a:r>
             <a:r>
-              <a:rPr lang="it-IT" sz="1200" dirty="0" err="1"/>
+              <a:rPr lang="it-IT" sz="1100" dirty="0" err="1"/>
               <a:t>larq</a:t>
             </a:r>
             <a:r>
-              <a:rPr lang="it-IT" sz="1200" dirty="0"/>
+              <a:rPr lang="it-IT" sz="1100" dirty="0"/>
               <a:t>/zoo/</a:t>
             </a:r>
             <a:r>
-              <a:rPr lang="it-IT" sz="1200" dirty="0" err="1"/>
+              <a:rPr lang="it-IT" sz="1100" dirty="0" err="1"/>
               <a:t>releases</a:t>
             </a:r>
             <a:r>
-              <a:rPr lang="it-IT" sz="1200" dirty="0"/>
+              <a:rPr lang="it-IT" sz="1100" dirty="0"/>
               <a:t>/download/quicknet-v1.0/quicknet_weights.h5</a:t>
             </a:r>
-            <a:endParaRPr lang="en-GB" sz="1200" dirty="0"/>
+            <a:endParaRPr lang="en-GB" sz="1100" dirty="0"/>
           </a:p>
           <a:p>
             <a:pPr lvl="1"/>
@@ -6239,38 +6239,38 @@
           <a:p>
             <a:pPr lvl="2"/>
             <a:r>
-              <a:rPr lang="it-IT" sz="1200" dirty="0" err="1"/>
+              <a:rPr lang="it-IT" sz="1100" dirty="0" err="1"/>
               <a:t>https</a:t>
             </a:r>
             <a:r>
-              <a:rPr lang="it-IT" sz="1200" dirty="0"/>
+              <a:rPr lang="it-IT" sz="1100" dirty="0"/>
               <a:t>://</a:t>
             </a:r>
             <a:r>
-              <a:rPr lang="it-IT" sz="1200" dirty="0" err="1"/>
+              <a:rPr lang="it-IT" sz="1100" dirty="0" err="1"/>
               <a:t>github.com</a:t>
             </a:r>
             <a:r>
-              <a:rPr lang="it-IT" sz="1200" dirty="0"/>
+              <a:rPr lang="it-IT" sz="1100" dirty="0"/>
               <a:t>/</a:t>
             </a:r>
             <a:r>
-              <a:rPr lang="it-IT" sz="1200" dirty="0" err="1"/>
+              <a:rPr lang="it-IT" sz="1100" dirty="0" err="1"/>
               <a:t>larq</a:t>
             </a:r>
             <a:r>
-              <a:rPr lang="it-IT" sz="1200" dirty="0"/>
+              <a:rPr lang="it-IT" sz="1100" dirty="0"/>
               <a:t>/zoo/</a:t>
             </a:r>
             <a:r>
-              <a:rPr lang="it-IT" sz="1200" dirty="0" err="1"/>
+              <a:rPr lang="it-IT" sz="1100" dirty="0" err="1"/>
               <a:t>releases</a:t>
             </a:r>
             <a:r>
-              <a:rPr lang="it-IT" sz="1200" dirty="0"/>
+              <a:rPr lang="it-IT" sz="1100" dirty="0"/>
               <a:t>/download/quicknet-v1.0/quicknet_small_weights.h5</a:t>
             </a:r>
-            <a:endParaRPr lang="en-GB" sz="1200" dirty="0"/>
+            <a:endParaRPr lang="en-GB" sz="1100" dirty="0"/>
           </a:p>
           <a:p>
             <a:pPr lvl="1"/>
@@ -6283,7 +6283,7 @@
           <a:p>
             <a:pPr lvl="2"/>
             <a:r>
-              <a:rPr lang="it-IT" sz="1200" dirty="0"/>
+              <a:rPr lang="it-IT" sz="1100" dirty="0"/>
               <a:t>https://github.com/larq/zoo/releases/download/quicknet-v1.0/quicknet_large_weights.h5</a:t>
             </a:r>
           </a:p>
@@ -6298,36 +6298,80 @@
           <a:p>
             <a:pPr lvl="2"/>
             <a:r>
-              <a:rPr lang="it-IT" sz="1200" dirty="0" err="1"/>
+              <a:rPr lang="it-IT" sz="1100" dirty="0" err="1"/>
               <a:t>https</a:t>
             </a:r>
             <a:r>
-              <a:rPr lang="it-IT" sz="1200" dirty="0"/>
+              <a:rPr lang="it-IT" sz="1100" dirty="0"/>
               <a:t>://</a:t>
             </a:r>
             <a:r>
-              <a:rPr lang="it-IT" sz="1200" dirty="0" err="1"/>
+              <a:rPr lang="it-IT" sz="1100" dirty="0" err="1"/>
               <a:t>github.com</a:t>
             </a:r>
             <a:r>
-              <a:rPr lang="it-IT" sz="1200" dirty="0"/>
+              <a:rPr lang="it-IT" sz="1100" dirty="0"/>
               <a:t>/</a:t>
             </a:r>
             <a:r>
-              <a:rPr lang="it-IT" sz="1200" dirty="0" err="1"/>
+              <a:rPr lang="it-IT" sz="1100" dirty="0" err="1"/>
               <a:t>larq</a:t>
             </a:r>
             <a:r>
-              <a:rPr lang="it-IT" sz="1200" dirty="0"/>
+              <a:rPr lang="it-IT" sz="1100" dirty="0"/>
               <a:t>/zoo/</a:t>
             </a:r>
             <a:r>
-              <a:rPr lang="it-IT" sz="1200" dirty="0" err="1"/>
+              <a:rPr lang="it-IT" sz="1100" dirty="0" err="1"/>
               <a:t>releases</a:t>
             </a:r>
             <a:r>
-              <a:rPr lang="it-IT" sz="1200" dirty="0"/>
+              <a:rPr lang="it-IT" sz="1100" dirty="0"/>
               <a:t>/download/binary_alexnet-v0.2.0/binary_alexnet_weights.h5</a:t>
+            </a:r>
+            <a:endParaRPr lang="it-IT" sz="1200" dirty="0"/>
+          </a:p>
+          <a:p>
+            <a:pPr lvl="1"/>
+            <a:r>
+              <a:rPr lang="it-IT" sz="1600" dirty="0" err="1"/>
+              <a:t>BiRealNet</a:t>
+            </a:r>
+            <a:endParaRPr lang="it-IT" sz="1600" dirty="0"/>
+          </a:p>
+          <a:p>
+            <a:pPr lvl="2"/>
+            <a:r>
+              <a:rPr lang="it-IT" sz="1100" dirty="0" err="1"/>
+              <a:t>https</a:t>
+            </a:r>
+            <a:r>
+              <a:rPr lang="it-IT" sz="1100" dirty="0"/>
+              <a:t>://</a:t>
+            </a:r>
+            <a:r>
+              <a:rPr lang="it-IT" sz="1100" dirty="0" err="1"/>
+              <a:t>github.com</a:t>
+            </a:r>
+            <a:r>
+              <a:rPr lang="it-IT" sz="1100" dirty="0"/>
+              <a:t>/</a:t>
+            </a:r>
+            <a:r>
+              <a:rPr lang="it-IT" sz="1100" dirty="0" err="1"/>
+              <a:t>larq</a:t>
+            </a:r>
+            <a:r>
+              <a:rPr lang="it-IT" sz="1100" dirty="0"/>
+              <a:t>/zoo/</a:t>
+            </a:r>
+            <a:r>
+              <a:rPr lang="it-IT" sz="1100" dirty="0" err="1"/>
+              <a:t>releases</a:t>
+            </a:r>
+            <a:r>
+              <a:rPr lang="it-IT" sz="1100" dirty="0"/>
+              <a:t>/download/birealnet-v0.3.0/birealnet_weights.h5</a:t>
             </a:r>
           </a:p>
           <a:p>
@@ -6944,14 +6988,14 @@
           <p:nvPr>
             <p:extLst>
               <p:ext uri="{D42A27DB-BD31-4B8C-83A1-F6EECF244321}">
-                <p14:modId xmlns:p14="http://schemas.microsoft.com/office/powerpoint/2010/main" val="2142948857"/>
+                <p14:modId xmlns:p14="http://schemas.microsoft.com/office/powerpoint/2010/main" val="4163623765"/>
               </p:ext>
             </p:extLst>
           </p:nvPr>
         </p:nvGraphicFramePr>
         <p:xfrm>
-          <a:off x="300037" y="1778008"/>
-          <a:ext cx="11079161" cy="3734892"/>
+          <a:off x="282804" y="1304924"/>
+          <a:ext cx="11180502" cy="2541131"/>
         </p:xfrm>
         <a:graphic>
           <a:graphicData uri="http://schemas.openxmlformats.org/drawingml/2006/table">
@@ -6960,35 +7004,35 @@
                 <a:tableStyleId>{5940675A-B579-460E-94D1-54222C63F5DA}</a:tableStyleId>
               </a:tblPr>
               <a:tblGrid>
-                <a:gridCol w="3693053">
+                <a:gridCol w="1776109">
                   <a:extLst>
                     <a:ext uri="{9D8B030D-6E8A-4147-A177-3AD203B41FA5}">
                       <a16:colId xmlns:a16="http://schemas.microsoft.com/office/drawing/2014/main" val="126020673"/>
                     </a:ext>
                   </a:extLst>
                 </a:gridCol>
-                <a:gridCol w="1846527">
+                <a:gridCol w="1913579">
                   <a:extLst>
                     <a:ext uri="{9D8B030D-6E8A-4147-A177-3AD203B41FA5}">
                       <a16:colId xmlns:a16="http://schemas.microsoft.com/office/drawing/2014/main" val="926368508"/>
                     </a:ext>
                   </a:extLst>
                 </a:gridCol>
-                <a:gridCol w="1846527">
+                <a:gridCol w="2379862">
                   <a:extLst>
                     <a:ext uri="{9D8B030D-6E8A-4147-A177-3AD203B41FA5}">
                       <a16:colId xmlns:a16="http://schemas.microsoft.com/office/drawing/2014/main" val="2013218858"/>
                     </a:ext>
                   </a:extLst>
                 </a:gridCol>
-                <a:gridCol w="1846527">
+                <a:gridCol w="2531253">
                   <a:extLst>
                     <a:ext uri="{9D8B030D-6E8A-4147-A177-3AD203B41FA5}">
                       <a16:colId xmlns:a16="http://schemas.microsoft.com/office/drawing/2014/main" val="1485657250"/>
                     </a:ext>
                   </a:extLst>
                 </a:gridCol>
-                <a:gridCol w="1846527">
+                <a:gridCol w="2579699">
                   <a:extLst>
                     <a:ext uri="{9D8B030D-6E8A-4147-A177-3AD203B41FA5}">
                       <a16:colId xmlns:a16="http://schemas.microsoft.com/office/drawing/2014/main" val="1822043009"/>
@@ -6996,7 +7040,7 @@
                   </a:extLst>
                 </a:gridCol>
               </a:tblGrid>
-              <a:tr h="606580">
+              <a:tr h="497491">
                 <a:tc>
                   <a:txBody>
                     <a:bodyPr/>
@@ -7004,7 +7048,7 @@
                     <a:p>
                       <a:pPr algn="ctr"/>
                       <a:r>
-                        <a:rPr lang="en-GB" sz="2400" dirty="0"/>
+                        <a:rPr lang="en-GB" sz="1800" dirty="0"/>
                         <a:t>NETWORK</a:t>
                       </a:r>
                     </a:p>
@@ -7018,7 +7062,7 @@
                     <a:p>
                       <a:pPr algn="ctr"/>
                       <a:r>
-                        <a:rPr lang="en-GB" sz="2400" dirty="0"/>
+                        <a:rPr lang="en-GB" sz="1800" dirty="0"/>
                         <a:t>RANDOM DATASET – 100 samples</a:t>
                       </a:r>
                     </a:p>
@@ -7042,15 +7086,8 @@
                     <a:p>
                       <a:pPr algn="ctr"/>
                       <a:r>
-                        <a:rPr lang="en-GB" sz="2400" dirty="0"/>
-                        <a:t>IMAGENET DATASET – </a:t>
-                      </a:r>
-                    </a:p>
-                    <a:p>
-                      <a:pPr algn="ctr"/>
-                      <a:r>
-                        <a:rPr lang="en-GB" sz="2400" dirty="0"/>
-                        <a:t>2000 samples</a:t>
+                        <a:rPr lang="en-GB" sz="1800" dirty="0"/>
+                        <a:t>IMAGENET DATASET – 2000 samples</a:t>
                       </a:r>
                     </a:p>
                   </a:txBody>
@@ -7072,7 +7109,7 @@
                   </a:ext>
                 </a:extLst>
               </a:tr>
-              <a:tr h="485612">
+              <a:tr h="284280">
                 <a:tc>
                   <a:txBody>
                     <a:bodyPr/>
@@ -7146,7 +7183,7 @@
                   </a:ext>
                 </a:extLst>
               </a:tr>
-              <a:tr h="606580">
+              <a:tr h="335576">
                 <a:tc>
                   <a:txBody>
                     <a:bodyPr/>
@@ -7154,10 +7191,10 @@
                     <a:p>
                       <a:pPr algn="ctr"/>
                       <a:r>
-                        <a:rPr lang="en-GB" dirty="0" err="1"/>
+                        <a:rPr lang="en-GB" sz="1400" dirty="0" err="1"/>
                         <a:t>QuickNet</a:t>
                       </a:r>
-                      <a:endParaRPr lang="en-GB" dirty="0"/>
+                      <a:endParaRPr lang="en-GB" sz="1400" dirty="0"/>
                     </a:p>
                   </a:txBody>
                   <a:tcPr anchor="ctr"/>
@@ -7169,10 +7206,9 @@
                     <a:p>
                       <a:pPr algn="ctr"/>
                       <a:r>
-                        <a:rPr lang="en-GB" sz="1800" dirty="0"/>
-                        <a:t>0,00004</a:t>
+                        <a:rPr lang="en-GB" sz="1400" dirty="0"/>
+                        <a:t>5.6e-05</a:t>
                       </a:r>
-                      <a:endParaRPr lang="en-GB" dirty="0"/>
                     </a:p>
                   </a:txBody>
                   <a:tcPr anchor="ctr"/>
@@ -7184,7 +7220,7 @@
                     <a:p>
                       <a:pPr algn="ctr"/>
                       <a:r>
-                        <a:rPr lang="en-GB" dirty="0"/>
+                        <a:rPr lang="en-GB" sz="1400" dirty="0"/>
                         <a:t>0</a:t>
                       </a:r>
                     </a:p>
@@ -7198,10 +7234,10 @@
                     <a:p>
                       <a:pPr algn="ctr"/>
                       <a:r>
-                        <a:rPr lang="en-GB" sz="1800" dirty="0"/>
+                        <a:rPr lang="en-GB" sz="1400"/>
                         <a:t>0,00014</a:t>
                       </a:r>
-                      <a:endParaRPr lang="en-GB" dirty="0"/>
+                      <a:endParaRPr lang="en-GB" sz="1400" dirty="0"/>
                     </a:p>
                   </a:txBody>
                   <a:tcPr anchor="ctr"/>
@@ -7212,10 +7248,7 @@
                     <a:lstStyle/>
                     <a:p>
                       <a:pPr algn="ctr"/>
-                      <a:r>
-                        <a:rPr lang="en-GB" dirty="0"/>
-                        <a:t>0</a:t>
-                      </a:r>
+                      <a:endParaRPr lang="en-GB" sz="1400" dirty="0"/>
                     </a:p>
                   </a:txBody>
                   <a:tcPr anchor="ctr"/>
@@ -7226,7 +7259,7 @@
                   </a:ext>
                 </a:extLst>
               </a:tr>
-              <a:tr h="606580">
+              <a:tr h="335576">
                 <a:tc>
                   <a:txBody>
                     <a:bodyPr/>
@@ -7234,11 +7267,11 @@
                     <a:p>
                       <a:pPr algn="ctr"/>
                       <a:r>
-                        <a:rPr lang="en-GB" dirty="0" err="1"/>
+                        <a:rPr lang="en-GB" sz="1400" dirty="0" err="1"/>
                         <a:t>QuickNet</a:t>
                       </a:r>
                       <a:r>
-                        <a:rPr lang="en-GB" dirty="0"/>
+                        <a:rPr lang="en-GB" sz="1400" dirty="0"/>
                         <a:t> Small</a:t>
                       </a:r>
                     </a:p>
@@ -7252,23 +7285,8 @@
                     <a:p>
                       <a:pPr algn="ctr"/>
                       <a:r>
-                        <a:rPr lang="en-GB" sz="1800" dirty="0"/>
-                        <a:t>0,00018</a:t>
-                      </a:r>
-                      <a:endParaRPr lang="en-GB" dirty="0"/>
-                    </a:p>
-                  </a:txBody>
-                  <a:tcPr anchor="ctr"/>
-                </a:tc>
-                <a:tc>
-                  <a:txBody>
-                    <a:bodyPr/>
-                    <a:lstStyle/>
-                    <a:p>
-                      <a:pPr algn="ctr"/>
-                      <a:r>
-                        <a:rPr lang="en-GB" dirty="0"/>
-                        <a:t>1</a:t>
+                        <a:rPr lang="en-GB" sz="1400" dirty="0"/>
+                        <a:t>0.0</a:t>
                       </a:r>
                     </a:p>
                   </a:txBody>
@@ -7281,10 +7299,9 @@
                     <a:p>
                       <a:pPr algn="ctr"/>
                       <a:r>
-                        <a:rPr lang="en-GB" sz="1800" dirty="0"/>
-                        <a:t>0,00003</a:t>
+                        <a:rPr lang="en-GB" sz="1400" dirty="0"/>
+                        <a:t>0</a:t>
                       </a:r>
-                      <a:endParaRPr lang="en-GB" dirty="0"/>
                     </a:p>
                   </a:txBody>
                   <a:tcPr anchor="ctr"/>
@@ -7296,9 +7313,21 @@
                     <a:p>
                       <a:pPr algn="ctr"/>
                       <a:r>
-                        <a:rPr lang="en-GB" dirty="0"/>
-                        <a:t>0</a:t>
+                        <a:rPr lang="en-GB" sz="1400"/>
+                        <a:t>0,00003</a:t>
                       </a:r>
+                      <a:endParaRPr lang="en-GB" sz="1400" dirty="0"/>
+                    </a:p>
+                  </a:txBody>
+                  <a:tcPr anchor="ctr"/>
+                </a:tc>
+                <a:tc>
+                  <a:txBody>
+                    <a:bodyPr/>
+                    <a:lstStyle/>
+                    <a:p>
+                      <a:pPr algn="ctr"/>
+                      <a:endParaRPr lang="en-GB" sz="1400" dirty="0"/>
                     </a:p>
                   </a:txBody>
                   <a:tcPr anchor="ctr"/>
@@ -7309,7 +7338,7 @@
                   </a:ext>
                 </a:extLst>
               </a:tr>
-              <a:tr h="606580">
+              <a:tr h="335576">
                 <a:tc>
                   <a:txBody>
                     <a:bodyPr/>
@@ -7317,11 +7346,11 @@
                     <a:p>
                       <a:pPr algn="ctr"/>
                       <a:r>
-                        <a:rPr lang="en-GB" dirty="0" err="1"/>
+                        <a:rPr lang="en-GB" sz="1400" dirty="0" err="1"/>
                         <a:t>QuickNet</a:t>
                       </a:r>
                       <a:r>
-                        <a:rPr lang="en-GB" dirty="0"/>
+                        <a:rPr lang="en-GB" sz="1400" dirty="0"/>
                         <a:t> Large</a:t>
                       </a:r>
                     </a:p>
@@ -7335,10 +7364,9 @@
                     <a:p>
                       <a:pPr algn="ctr"/>
                       <a:r>
-                        <a:rPr lang="en-GB" sz="1800" dirty="0"/>
-                        <a:t>0,00028</a:t>
+                        <a:rPr lang="en-GB" sz="1400" dirty="0"/>
+                        <a:t>6.9e-18</a:t>
                       </a:r>
-                      <a:endParaRPr lang="en-GB" dirty="0"/>
                     </a:p>
                   </a:txBody>
                   <a:tcPr anchor="ctr"/>
@@ -7350,7 +7378,7 @@
                     <a:p>
                       <a:pPr algn="ctr"/>
                       <a:r>
-                        <a:rPr lang="en-GB" dirty="0"/>
+                        <a:rPr lang="en-GB" sz="1400" dirty="0"/>
                         <a:t>0</a:t>
                       </a:r>
                     </a:p>
@@ -7364,10 +7392,43 @@
                     <a:p>
                       <a:pPr algn="ctr"/>
                       <a:r>
-                        <a:rPr lang="en-GB" sz="1800" dirty="0"/>
+                        <a:rPr lang="en-GB" sz="1400"/>
                         <a:t>0,00023</a:t>
                       </a:r>
-                      <a:endParaRPr lang="en-GB" dirty="0"/>
+                      <a:endParaRPr lang="en-GB" sz="1400" dirty="0"/>
+                    </a:p>
+                  </a:txBody>
+                  <a:tcPr anchor="ctr"/>
+                </a:tc>
+                <a:tc>
+                  <a:txBody>
+                    <a:bodyPr/>
+                    <a:lstStyle/>
+                    <a:p>
+                      <a:pPr algn="ctr"/>
+                      <a:endParaRPr lang="en-GB" sz="1400" dirty="0"/>
+                    </a:p>
+                  </a:txBody>
+                  <a:tcPr anchor="ctr"/>
+                </a:tc>
+                <a:extLst>
+                  <a:ext uri="{0D108BD9-81ED-4DB2-BD59-A6C34878D82A}">
+                    <a16:rowId xmlns:a16="http://schemas.microsoft.com/office/drawing/2014/main" val="3718629246"/>
+                  </a:ext>
+                </a:extLst>
+              </a:tr>
+              <a:tr h="335576">
+                <a:tc>
+                  <a:txBody>
+                    <a:bodyPr/>
+                    <a:lstStyle/>
+                    <a:p>
+                      <a:pPr algn="ctr"/>
+                      <a:r>
+                        <a:rPr lang="en-GB" sz="1400" dirty="0" err="1"/>
+                        <a:t>AlexNet</a:t>
+                      </a:r>
+                      <a:endParaRPr lang="en-GB" sz="1400" dirty="0"/>
                     </a:p>
                   </a:txBody>
                   <a:tcPr anchor="ctr"/>
@@ -7379,44 +7440,8 @@
                     <a:p>
                       <a:pPr algn="ctr"/>
                       <a:r>
-                        <a:rPr lang="en-GB" dirty="0"/>
-                        <a:t>0</a:t>
-                      </a:r>
-                    </a:p>
-                  </a:txBody>
-                  <a:tcPr anchor="ctr"/>
-                </a:tc>
-                <a:extLst>
-                  <a:ext uri="{0D108BD9-81ED-4DB2-BD59-A6C34878D82A}">
-                    <a16:rowId xmlns:a16="http://schemas.microsoft.com/office/drawing/2014/main" val="3718629246"/>
-                  </a:ext>
-                </a:extLst>
-              </a:tr>
-              <a:tr h="606580">
-                <a:tc>
-                  <a:txBody>
-                    <a:bodyPr/>
-                    <a:lstStyle/>
-                    <a:p>
-                      <a:pPr algn="ctr"/>
-                      <a:r>
-                        <a:rPr lang="en-GB" dirty="0" err="1"/>
-                        <a:t>AlexNet</a:t>
-                      </a:r>
-                      <a:endParaRPr lang="en-GB" dirty="0"/>
-                    </a:p>
-                  </a:txBody>
-                  <a:tcPr anchor="ctr"/>
-                </a:tc>
-                <a:tc>
-                  <a:txBody>
-                    <a:bodyPr/>
-                    <a:lstStyle/>
-                    <a:p>
-                      <a:pPr algn="ctr"/>
-                      <a:r>
-                        <a:rPr lang="en-GB" dirty="0"/>
-                        <a:t>0,00064</a:t>
+                        <a:rPr lang="en-GB" sz="1400" dirty="0"/>
+                        <a:t>0.0</a:t>
                       </a:r>
                     </a:p>
                   </a:txBody>
@@ -7429,8 +7454,66 @@
                     <a:p>
                       <a:pPr algn="ctr"/>
                       <a:r>
-                        <a:rPr lang="en-GB" dirty="0"/>
-                        <a:t>1</a:t>
+                        <a:rPr lang="en-GB" sz="1400" dirty="0"/>
+                        <a:t>0</a:t>
+                      </a:r>
+                    </a:p>
+                  </a:txBody>
+                  <a:tcPr anchor="ctr"/>
+                </a:tc>
+                <a:tc>
+                  <a:txBody>
+                    <a:bodyPr/>
+                    <a:lstStyle/>
+                    <a:p>
+                      <a:pPr algn="ctr"/>
+                      <a:endParaRPr lang="en-GB" sz="1400" dirty="0"/>
+                    </a:p>
+                  </a:txBody>
+                  <a:tcPr anchor="ctr"/>
+                </a:tc>
+                <a:tc>
+                  <a:txBody>
+                    <a:bodyPr/>
+                    <a:lstStyle/>
+                    <a:p>
+                      <a:pPr algn="ctr"/>
+                      <a:endParaRPr lang="en-GB" sz="1400" dirty="0"/>
+                    </a:p>
+                  </a:txBody>
+                  <a:tcPr anchor="ctr"/>
+                </a:tc>
+                <a:extLst>
+                  <a:ext uri="{0D108BD9-81ED-4DB2-BD59-A6C34878D82A}">
+                    <a16:rowId xmlns:a16="http://schemas.microsoft.com/office/drawing/2014/main" val="528723341"/>
+                  </a:ext>
+                </a:extLst>
+              </a:tr>
+              <a:tr h="335576">
+                <a:tc>
+                  <a:txBody>
+                    <a:bodyPr/>
+                    <a:lstStyle/>
+                    <a:p>
+                      <a:pPr algn="ctr"/>
+                      <a:r>
+                        <a:rPr lang="en-GB" sz="1400" dirty="0" err="1"/>
+                        <a:t>BiRealNet</a:t>
+                      </a:r>
+                      <a:endParaRPr lang="en-GB" sz="1400" dirty="0"/>
+                    </a:p>
+                  </a:txBody>
+                  <a:tcPr anchor="ctr"/>
+                </a:tc>
+                <a:tc>
+                  <a:txBody>
+                    <a:bodyPr/>
+                    <a:lstStyle/>
+                    <a:p>
+                      <a:pPr algn="ctr"/>
+                      <a:r>
+                        <a:rPr lang="en-GB" sz="1400" dirty="0"/>
+                        <a:t>8.4e-05</a:t>
                       </a:r>
                     </a:p>
                   </a:txBody>
@@ -7443,8 +7526,8 @@
                     <a:p>
                       <a:pPr algn="ctr"/>
                       <a:r>
-                        <a:rPr lang="en-GB" dirty="0"/>
-                        <a:t>0,00029</a:t>
+                        <a:rPr lang="en-GB" sz="1400" dirty="0"/>
+                        <a:t>6</a:t>
                       </a:r>
                     </a:p>
                   </a:txBody>
@@ -7456,17 +7539,25 @@
                     <a:lstStyle/>
                     <a:p>
                       <a:pPr algn="ctr"/>
-                      <a:r>
-                        <a:rPr lang="en-GB" dirty="0"/>
-                        <a:t>1</a:t>
-                      </a:r>
+                      <a:endParaRPr lang="en-GB" sz="1400" dirty="0"/>
+                    </a:p>
+                  </a:txBody>
+                  <a:tcPr anchor="ctr"/>
+                </a:tc>
+                <a:tc>
+                  <a:txBody>
+                    <a:bodyPr/>
+                    <a:lstStyle/>
+                    <a:p>
+                      <a:pPr algn="ctr"/>
+                      <a:endParaRPr lang="en-GB" sz="1400" dirty="0"/>
                     </a:p>
                   </a:txBody>
                   <a:tcPr anchor="ctr"/>
                 </a:tc>
                 <a:extLst>
                   <a:ext uri="{0D108BD9-81ED-4DB2-BD59-A6C34878D82A}">
-                    <a16:rowId xmlns:a16="http://schemas.microsoft.com/office/drawing/2014/main" val="528723341"/>
+                    <a16:rowId xmlns:a16="http://schemas.microsoft.com/office/drawing/2014/main" val="1232446905"/>
                   </a:ext>
                 </a:extLst>
               </a:tr>
@@ -8394,6 +8485,12 @@
 </file>
 
 <file path=customXml/item1.xml><?xml version="1.0" encoding="utf-8"?>
+<p:properties xmlns:p="http://schemas.microsoft.com/office/2006/metadata/properties" xmlns:xsi="http://www.w3.org/2001/XMLSchema-instance" xmlns:pc="http://schemas.microsoft.com/office/infopath/2007/PartnerControls">
+  <documentManagement/>
+</p:properties>
+</file>
+
+<file path=customXml/item2.xml><?xml version="1.0" encoding="utf-8"?>
 <ct:contentTypeSchema xmlns:ct="http://schemas.microsoft.com/office/2006/metadata/contentType" xmlns:ma="http://schemas.microsoft.com/office/2006/metadata/properties/metaAttributes" ct:_="" ma:_="" ma:contentTypeName="Document" ma:contentTypeID="0x0101000A211AD5DA37A9458C2962493D7DC14B" ma:contentTypeVersion="13" ma:contentTypeDescription="Create a new document." ma:contentTypeScope="" ma:versionID="f864bb5674d80d70a838dc29a2d66eef">
   <xsd:schema xmlns:xsd="http://www.w3.org/2001/XMLSchema" xmlns:xs="http://www.w3.org/2001/XMLSchema" xmlns:p="http://schemas.microsoft.com/office/2006/metadata/properties" xmlns:ns3="f3053290-03f5-4abd-a502-4193d9a980c9" xmlns:ns4="109e6646-2a17-4c65-a606-79e019c3d0f9" targetNamespace="http://schemas.microsoft.com/office/2006/metadata/properties" ma:root="true" ma:fieldsID="c090818561f5719306ae599b8a0af89b" ns3:_="" ns4:_="">
     <xsd:import namespace="f3053290-03f5-4abd-a502-4193d9a980c9"/>
@@ -8616,12 +8713,6 @@
 </ct:contentTypeSchema>
 </file>
 
-<file path=customXml/item2.xml><?xml version="1.0" encoding="utf-8"?>
-<p:properties xmlns:p="http://schemas.microsoft.com/office/2006/metadata/properties" xmlns:xsi="http://www.w3.org/2001/XMLSchema-instance" xmlns:pc="http://schemas.microsoft.com/office/infopath/2007/PartnerControls">
-  <documentManagement/>
-</p:properties>
-</file>
-
 <file path=customXml/item3.xml><?xml version="1.0" encoding="utf-8"?>
 <?mso-contentType ?>
 <FormTemplates xmlns="http://schemas.microsoft.com/sharepoint/v3/contenttype/forms">
@@ -8632,6 +8723,23 @@
 </file>
 
 <file path=customXml/itemProps1.xml><?xml version="1.0" encoding="utf-8"?>
+<ds:datastoreItem xmlns:ds="http://schemas.openxmlformats.org/officeDocument/2006/customXml" ds:itemID="{035860E1-69D5-4E74-884D-9FA623A0A3A9}">
+  <ds:schemaRefs>
+    <ds:schemaRef ds:uri="http://purl.org/dc/terms/"/>
+    <ds:schemaRef ds:uri="http://schemas.openxmlformats.org/package/2006/metadata/core-properties"/>
+    <ds:schemaRef ds:uri="http://schemas.microsoft.com/office/2006/documentManagement/types"/>
+    <ds:schemaRef ds:uri="http://schemas.microsoft.com/office/infopath/2007/PartnerControls"/>
+    <ds:schemaRef ds:uri="http://purl.org/dc/elements/1.1/"/>
+    <ds:schemaRef ds:uri="http://schemas.microsoft.com/office/2006/metadata/properties"/>
+    <ds:schemaRef ds:uri="f3053290-03f5-4abd-a502-4193d9a980c9"/>
+    <ds:schemaRef ds:uri="109e6646-2a17-4c65-a606-79e019c3d0f9"/>
+    <ds:schemaRef ds:uri="http://www.w3.org/XML/1998/namespace"/>
+    <ds:schemaRef ds:uri="http://purl.org/dc/dcmitype/"/>
+  </ds:schemaRefs>
+</ds:datastoreItem>
+</file>
+
+<file path=customXml/itemProps2.xml><?xml version="1.0" encoding="utf-8"?>
 <ds:datastoreItem xmlns:ds="http://schemas.openxmlformats.org/officeDocument/2006/customXml" ds:itemID="{809C4ACF-9EFE-4633-BBA5-B8C4D4C3EE1F}">
   <ds:schemaRefs>
     <ds:schemaRef ds:uri="http://schemas.microsoft.com/office/2006/metadata/contentType"/>
@@ -8650,23 +8758,6 @@
 </ds:datastoreItem>
 </file>
 
-<file path=customXml/itemProps2.xml><?xml version="1.0" encoding="utf-8"?>
-<ds:datastoreItem xmlns:ds="http://schemas.openxmlformats.org/officeDocument/2006/customXml" ds:itemID="{035860E1-69D5-4E74-884D-9FA623A0A3A9}">
-  <ds:schemaRefs>
-    <ds:schemaRef ds:uri="http://purl.org/dc/terms/"/>
-    <ds:schemaRef ds:uri="http://schemas.openxmlformats.org/package/2006/metadata/core-properties"/>
-    <ds:schemaRef ds:uri="http://schemas.microsoft.com/office/2006/documentManagement/types"/>
-    <ds:schemaRef ds:uri="http://schemas.microsoft.com/office/infopath/2007/PartnerControls"/>
-    <ds:schemaRef ds:uri="http://purl.org/dc/elements/1.1/"/>
-    <ds:schemaRef ds:uri="http://schemas.microsoft.com/office/2006/metadata/properties"/>
-    <ds:schemaRef ds:uri="f3053290-03f5-4abd-a502-4193d9a980c9"/>
-    <ds:schemaRef ds:uri="109e6646-2a17-4c65-a606-79e019c3d0f9"/>
-    <ds:schemaRef ds:uri="http://www.w3.org/XML/1998/namespace"/>
-    <ds:schemaRef ds:uri="http://purl.org/dc/dcmitype/"/>
-  </ds:schemaRefs>
-</ds:datastoreItem>
-</file>
-
 <file path=customXml/itemProps3.xml><?xml version="1.0" encoding="utf-8"?>
 <ds:datastoreItem xmlns:ds="http://schemas.openxmlformats.org/officeDocument/2006/customXml" ds:itemID="{EF96EF55-315B-4492-B764-01F013E488A1}">
   <ds:schemaRefs>

</xml_diff>

<commit_message>
added binary resnet e 18
</commit_message>
<xml_diff>
--- a/zoo_qkeras_vs_larq.pptx
+++ b/zoo_qkeras_vs_larq.pptx
@@ -241,7 +241,7 @@
               <a:rPr lang="fr-FR" smtClean="0">
                 <a:latin typeface="Arial" panose="020B0604020202020204" pitchFamily="34" charset="0"/>
               </a:rPr>
-              <a:t>23/03/2021</a:t>
+              <a:t>25/03/2021</a:t>
             </a:fld>
             <a:endParaRPr lang="fr-FR" dirty="0">
               <a:latin typeface="Arial" panose="020B0604020202020204" pitchFamily="34" charset="0"/>
@@ -431,7 +431,7 @@
             <a:fld id="{71C683A4-DA5F-4AC0-B623-C481774958C7}" type="datetimeFigureOut">
               <a:rPr lang="fr-FR" smtClean="0"/>
               <a:pPr/>
-              <a:t>23/03/2021</a:t>
+              <a:t>25/03/2021</a:t>
             </a:fld>
             <a:endParaRPr lang="fr-FR" dirty="0"/>
           </a:p>
@@ -1978,7 +1978,7 @@
           <a:p>
             <a:fld id="{1B5AEA7E-51B5-4CB2-80D5-15820A17CAE3}" type="datetime5">
               <a:rPr lang="en-US" smtClean="0"/>
-              <a:t>23-Mar-21</a:t>
+              <a:t>25-Mar-21</a:t>
             </a:fld>
             <a:endParaRPr lang="fr-FR"/>
           </a:p>
@@ -2562,7 +2562,7 @@
           <a:p>
             <a:fld id="{6CAAEE57-6C7A-4485-90B9-68FD3C018D4D}" type="datetime5">
               <a:rPr lang="en-US" smtClean="0"/>
-              <a:t>23-Mar-21</a:t>
+              <a:t>25-Mar-21</a:t>
             </a:fld>
             <a:endParaRPr lang="fr-FR" dirty="0"/>
           </a:p>
@@ -2732,7 +2732,7 @@
           <a:p>
             <a:fld id="{96EB4663-F7A4-4D1C-A9ED-CB0F8B6C7043}" type="datetime5">
               <a:rPr lang="en-US" smtClean="0"/>
-              <a:t>23-Mar-21</a:t>
+              <a:t>25-Mar-21</a:t>
             </a:fld>
             <a:endParaRPr lang="fr-FR" dirty="0"/>
           </a:p>
@@ -2881,7 +2881,7 @@
           <a:p>
             <a:fld id="{6BA86AAF-A50C-4368-8908-D3A4D71BEB6A}" type="datetime5">
               <a:rPr lang="en-US" smtClean="0"/>
-              <a:t>23-Mar-21</a:t>
+              <a:t>25-Mar-21</a:t>
             </a:fld>
             <a:endParaRPr lang="fr-FR" dirty="0"/>
           </a:p>
@@ -3651,7 +3651,7 @@
           <a:p>
             <a:fld id="{49D6B855-A76D-4459-A823-EF680B29CDD3}" type="datetime5">
               <a:rPr lang="en-US" smtClean="0"/>
-              <a:t>23-Mar-21</a:t>
+              <a:t>25-Mar-21</a:t>
             </a:fld>
             <a:endParaRPr lang="fr-FR" dirty="0"/>
           </a:p>
@@ -6375,6 +6375,49 @@
             </a:r>
           </a:p>
           <a:p>
+            <a:pPr lvl="1"/>
+            <a:r>
+              <a:rPr lang="it-IT" sz="1600" dirty="0"/>
+              <a:t>Binary_resnet_e18</a:t>
+            </a:r>
+          </a:p>
+          <a:p>
+            <a:pPr lvl="2"/>
+            <a:r>
+              <a:rPr lang="it-IT" sz="1100" dirty="0" err="1"/>
+              <a:t>https</a:t>
+            </a:r>
+            <a:r>
+              <a:rPr lang="it-IT" sz="1100" dirty="0"/>
+              <a:t>://</a:t>
+            </a:r>
+            <a:r>
+              <a:rPr lang="it-IT" sz="1100" dirty="0" err="1"/>
+              <a:t>github.com</a:t>
+            </a:r>
+            <a:r>
+              <a:rPr lang="it-IT" sz="1100" dirty="0"/>
+              <a:t>/</a:t>
+            </a:r>
+            <a:r>
+              <a:rPr lang="it-IT" sz="1100" dirty="0" err="1"/>
+              <a:t>larq</a:t>
+            </a:r>
+            <a:r>
+              <a:rPr lang="it-IT" sz="1100" dirty="0"/>
+              <a:t>/zoo/</a:t>
+            </a:r>
+            <a:r>
+              <a:rPr lang="it-IT" sz="1100" dirty="0" err="1"/>
+              <a:t>releases</a:t>
+            </a:r>
+            <a:r>
+              <a:rPr lang="it-IT" sz="1100" dirty="0"/>
+              <a:t>/download/resnet_e-v0.1.0/resnet_e_18_weights.json</a:t>
+            </a:r>
+            <a:endParaRPr lang="it-IT" sz="1300" dirty="0"/>
+          </a:p>
+          <a:p>
             <a:pPr lvl="2"/>
             <a:endParaRPr lang="en-GB" dirty="0"/>
           </a:p>
@@ -6988,14 +7031,14 @@
           <p:nvPr>
             <p:extLst>
               <p:ext uri="{D42A27DB-BD31-4B8C-83A1-F6EECF244321}">
-                <p14:modId xmlns:p14="http://schemas.microsoft.com/office/powerpoint/2010/main" val="4163623765"/>
+                <p14:modId xmlns:p14="http://schemas.microsoft.com/office/powerpoint/2010/main" val="3540246808"/>
               </p:ext>
             </p:extLst>
           </p:nvPr>
         </p:nvGraphicFramePr>
         <p:xfrm>
           <a:off x="282804" y="1304924"/>
-          <a:ext cx="11180502" cy="2541131"/>
+          <a:ext cx="11180502" cy="2876707"/>
         </p:xfrm>
         <a:graphic>
           <a:graphicData uri="http://schemas.openxmlformats.org/drawingml/2006/table">
@@ -7558,6 +7601,85 @@
                 <a:extLst>
                   <a:ext uri="{0D108BD9-81ED-4DB2-BD59-A6C34878D82A}">
                     <a16:rowId xmlns:a16="http://schemas.microsoft.com/office/drawing/2014/main" val="1232446905"/>
+                  </a:ext>
+                </a:extLst>
+              </a:tr>
+              <a:tr h="335576">
+                <a:tc>
+                  <a:txBody>
+                    <a:bodyPr/>
+                    <a:lstStyle/>
+                    <a:p>
+                      <a:pPr algn="ctr"/>
+                      <a:r>
+                        <a:rPr lang="en-GB" sz="1400" dirty="0"/>
+                        <a:t>Binary </a:t>
+                      </a:r>
+                      <a:r>
+                        <a:rPr lang="en-GB" sz="1400" dirty="0" err="1"/>
+                        <a:t>ResNet</a:t>
+                      </a:r>
+                      <a:r>
+                        <a:rPr lang="en-GB" sz="1400" dirty="0"/>
+                        <a:t> e18</a:t>
+                      </a:r>
+                    </a:p>
+                  </a:txBody>
+                  <a:tcPr anchor="ctr"/>
+                </a:tc>
+                <a:tc>
+                  <a:txBody>
+                    <a:bodyPr/>
+                    <a:lstStyle/>
+                    <a:p>
+                      <a:pPr algn="ctr"/>
+                      <a:r>
+                        <a:rPr lang="en-GB" sz="1400" dirty="0"/>
+                        <a:t>0.0</a:t>
+                      </a:r>
+                    </a:p>
+                  </a:txBody>
+                  <a:tcPr anchor="ctr"/>
+                </a:tc>
+                <a:tc>
+                  <a:txBody>
+                    <a:bodyPr/>
+                    <a:lstStyle/>
+                    <a:p>
+                      <a:pPr algn="ctr"/>
+                      <a:r>
+                        <a:rPr lang="en-GB" sz="1400" dirty="0"/>
+                        <a:t>0</a:t>
+                      </a:r>
+                    </a:p>
+                  </a:txBody>
+                  <a:tcPr anchor="ctr"/>
+                </a:tc>
+                <a:tc>
+                  <a:txBody>
+                    <a:bodyPr/>
+                    <a:lstStyle/>
+                    <a:p>
+                      <a:pPr algn="ctr"/>
+                      <a:endParaRPr lang="en-GB" sz="1400" dirty="0"/>
+                    </a:p>
+                  </a:txBody>
+                  <a:tcPr anchor="ctr"/>
+                </a:tc>
+                <a:tc>
+                  <a:txBody>
+                    <a:bodyPr/>
+                    <a:lstStyle/>
+                    <a:p>
+                      <a:pPr algn="ctr"/>
+                      <a:endParaRPr lang="en-GB" sz="1400" dirty="0"/>
+                    </a:p>
+                  </a:txBody>
+                  <a:tcPr anchor="ctr"/>
+                </a:tc>
+                <a:extLst>
+                  <a:ext uri="{0D108BD9-81ED-4DB2-BD59-A6C34878D82A}">
+                    <a16:rowId xmlns:a16="http://schemas.microsoft.com/office/drawing/2014/main" val="3671791928"/>
                   </a:ext>
                 </a:extLst>
               </a:tr>
@@ -8485,12 +8607,6 @@
 </file>
 
 <file path=customXml/item1.xml><?xml version="1.0" encoding="utf-8"?>
-<p:properties xmlns:p="http://schemas.microsoft.com/office/2006/metadata/properties" xmlns:xsi="http://www.w3.org/2001/XMLSchema-instance" xmlns:pc="http://schemas.microsoft.com/office/infopath/2007/PartnerControls">
-  <documentManagement/>
-</p:properties>
-</file>
-
-<file path=customXml/item2.xml><?xml version="1.0" encoding="utf-8"?>
 <ct:contentTypeSchema xmlns:ct="http://schemas.microsoft.com/office/2006/metadata/contentType" xmlns:ma="http://schemas.microsoft.com/office/2006/metadata/properties/metaAttributes" ct:_="" ma:_="" ma:contentTypeName="Document" ma:contentTypeID="0x0101000A211AD5DA37A9458C2962493D7DC14B" ma:contentTypeVersion="13" ma:contentTypeDescription="Create a new document." ma:contentTypeScope="" ma:versionID="f864bb5674d80d70a838dc29a2d66eef">
   <xsd:schema xmlns:xsd="http://www.w3.org/2001/XMLSchema" xmlns:xs="http://www.w3.org/2001/XMLSchema" xmlns:p="http://schemas.microsoft.com/office/2006/metadata/properties" xmlns:ns3="f3053290-03f5-4abd-a502-4193d9a980c9" xmlns:ns4="109e6646-2a17-4c65-a606-79e019c3d0f9" targetNamespace="http://schemas.microsoft.com/office/2006/metadata/properties" ma:root="true" ma:fieldsID="c090818561f5719306ae599b8a0af89b" ns3:_="" ns4:_="">
     <xsd:import namespace="f3053290-03f5-4abd-a502-4193d9a980c9"/>
@@ -8713,6 +8829,12 @@
 </ct:contentTypeSchema>
 </file>
 
+<file path=customXml/item2.xml><?xml version="1.0" encoding="utf-8"?>
+<p:properties xmlns:p="http://schemas.microsoft.com/office/2006/metadata/properties" xmlns:xsi="http://www.w3.org/2001/XMLSchema-instance" xmlns:pc="http://schemas.microsoft.com/office/infopath/2007/PartnerControls">
+  <documentManagement/>
+</p:properties>
+</file>
+
 <file path=customXml/item3.xml><?xml version="1.0" encoding="utf-8"?>
 <?mso-contentType ?>
 <FormTemplates xmlns="http://schemas.microsoft.com/sharepoint/v3/contenttype/forms">
@@ -8723,23 +8845,6 @@
 </file>
 
 <file path=customXml/itemProps1.xml><?xml version="1.0" encoding="utf-8"?>
-<ds:datastoreItem xmlns:ds="http://schemas.openxmlformats.org/officeDocument/2006/customXml" ds:itemID="{035860E1-69D5-4E74-884D-9FA623A0A3A9}">
-  <ds:schemaRefs>
-    <ds:schemaRef ds:uri="http://purl.org/dc/terms/"/>
-    <ds:schemaRef ds:uri="http://schemas.openxmlformats.org/package/2006/metadata/core-properties"/>
-    <ds:schemaRef ds:uri="http://schemas.microsoft.com/office/2006/documentManagement/types"/>
-    <ds:schemaRef ds:uri="http://schemas.microsoft.com/office/infopath/2007/PartnerControls"/>
-    <ds:schemaRef ds:uri="http://purl.org/dc/elements/1.1/"/>
-    <ds:schemaRef ds:uri="http://schemas.microsoft.com/office/2006/metadata/properties"/>
-    <ds:schemaRef ds:uri="f3053290-03f5-4abd-a502-4193d9a980c9"/>
-    <ds:schemaRef ds:uri="109e6646-2a17-4c65-a606-79e019c3d0f9"/>
-    <ds:schemaRef ds:uri="http://www.w3.org/XML/1998/namespace"/>
-    <ds:schemaRef ds:uri="http://purl.org/dc/dcmitype/"/>
-  </ds:schemaRefs>
-</ds:datastoreItem>
-</file>
-
-<file path=customXml/itemProps2.xml><?xml version="1.0" encoding="utf-8"?>
 <ds:datastoreItem xmlns:ds="http://schemas.openxmlformats.org/officeDocument/2006/customXml" ds:itemID="{809C4ACF-9EFE-4633-BBA5-B8C4D4C3EE1F}">
   <ds:schemaRefs>
     <ds:schemaRef ds:uri="http://schemas.microsoft.com/office/2006/metadata/contentType"/>
@@ -8758,6 +8863,23 @@
 </ds:datastoreItem>
 </file>
 
+<file path=customXml/itemProps2.xml><?xml version="1.0" encoding="utf-8"?>
+<ds:datastoreItem xmlns:ds="http://schemas.openxmlformats.org/officeDocument/2006/customXml" ds:itemID="{035860E1-69D5-4E74-884D-9FA623A0A3A9}">
+  <ds:schemaRefs>
+    <ds:schemaRef ds:uri="http://purl.org/dc/terms/"/>
+    <ds:schemaRef ds:uri="http://schemas.openxmlformats.org/package/2006/metadata/core-properties"/>
+    <ds:schemaRef ds:uri="http://schemas.microsoft.com/office/2006/documentManagement/types"/>
+    <ds:schemaRef ds:uri="http://schemas.microsoft.com/office/infopath/2007/PartnerControls"/>
+    <ds:schemaRef ds:uri="http://purl.org/dc/elements/1.1/"/>
+    <ds:schemaRef ds:uri="http://schemas.microsoft.com/office/2006/metadata/properties"/>
+    <ds:schemaRef ds:uri="f3053290-03f5-4abd-a502-4193d9a980c9"/>
+    <ds:schemaRef ds:uri="109e6646-2a17-4c65-a606-79e019c3d0f9"/>
+    <ds:schemaRef ds:uri="http://www.w3.org/XML/1998/namespace"/>
+    <ds:schemaRef ds:uri="http://purl.org/dc/dcmitype/"/>
+  </ds:schemaRefs>
+</ds:datastoreItem>
+</file>
+
 <file path=customXml/itemProps3.xml><?xml version="1.0" encoding="utf-8"?>
 <ds:datastoreItem xmlns:ds="http://schemas.openxmlformats.org/officeDocument/2006/customXml" ds:itemID="{EF96EF55-315B-4492-B764-01F013E488A1}">
   <ds:schemaRefs>

</xml_diff>

<commit_message>
added XNORNet and Binary to Real Net
</commit_message>
<xml_diff>
--- a/zoo_qkeras_vs_larq.pptx
+++ b/zoo_qkeras_vs_larq.pptx
@@ -5,10 +5,10 @@
     <p:sldMasterId id="2147483660" r:id="rId4"/>
   </p:sldMasterIdLst>
   <p:notesMasterIdLst>
-    <p:notesMasterId r:id="rId20"/>
+    <p:notesMasterId r:id="rId21"/>
   </p:notesMasterIdLst>
   <p:handoutMasterIdLst>
-    <p:handoutMasterId r:id="rId21"/>
+    <p:handoutMasterId r:id="rId22"/>
   </p:handoutMasterIdLst>
   <p:sldIdLst>
     <p:sldId id="262" r:id="rId5"/>
@@ -21,16 +21,17 @@
     <p:sldId id="278" r:id="rId12"/>
     <p:sldId id="279" r:id="rId13"/>
     <p:sldId id="280" r:id="rId14"/>
-    <p:sldId id="270" r:id="rId15"/>
-    <p:sldId id="272" r:id="rId16"/>
-    <p:sldId id="274" r:id="rId17"/>
-    <p:sldId id="281" r:id="rId18"/>
-    <p:sldId id="268" r:id="rId19"/>
+    <p:sldId id="282" r:id="rId15"/>
+    <p:sldId id="270" r:id="rId16"/>
+    <p:sldId id="272" r:id="rId17"/>
+    <p:sldId id="274" r:id="rId18"/>
+    <p:sldId id="281" r:id="rId19"/>
+    <p:sldId id="268" r:id="rId20"/>
   </p:sldIdLst>
   <p:sldSz cx="12192000" cy="6858000"/>
   <p:notesSz cx="6858000" cy="9144000"/>
   <p:custDataLst>
-    <p:tags r:id="rId22"/>
+    <p:tags r:id="rId23"/>
   </p:custDataLst>
   <p:defaultTextStyle>
     <a:defPPr>
@@ -247,7 +248,7 @@
               <a:rPr lang="fr-FR" smtClean="0">
                 <a:latin typeface="Arial" panose="020B0604020202020204" pitchFamily="34" charset="0"/>
               </a:rPr>
-              <a:t>29/03/2021</a:t>
+              <a:t>01/04/2021</a:t>
             </a:fld>
             <a:endParaRPr lang="fr-FR" dirty="0">
               <a:latin typeface="Arial" panose="020B0604020202020204" pitchFamily="34" charset="0"/>
@@ -437,7 +438,7 @@
             <a:fld id="{71C683A4-DA5F-4AC0-B623-C481774958C7}" type="datetimeFigureOut">
               <a:rPr lang="fr-FR" smtClean="0"/>
               <a:pPr/>
-              <a:t>29/03/2021</a:t>
+              <a:t>01/04/2021</a:t>
             </a:fld>
             <a:endParaRPr lang="fr-FR" dirty="0"/>
           </a:p>
@@ -1111,7 +1112,7 @@
           <a:p>
             <a:fld id="{BC58E59B-3326-4FD4-8806-9EAC0DB7D607}" type="slidenum">
               <a:rPr lang="en-US" smtClean="0"/>
-              <a:t>15</a:t>
+              <a:t>16</a:t>
             </a:fld>
             <a:endParaRPr lang="en-US" dirty="0"/>
           </a:p>
@@ -1984,7 +1985,7 @@
           <a:p>
             <a:fld id="{1B5AEA7E-51B5-4CB2-80D5-15820A17CAE3}" type="datetime5">
               <a:rPr lang="en-US" smtClean="0"/>
-              <a:t>29-Mar-21</a:t>
+              <a:t>1-Apr-21</a:t>
             </a:fld>
             <a:endParaRPr lang="fr-FR"/>
           </a:p>
@@ -2568,7 +2569,7 @@
           <a:p>
             <a:fld id="{6CAAEE57-6C7A-4485-90B9-68FD3C018D4D}" type="datetime5">
               <a:rPr lang="en-US" smtClean="0"/>
-              <a:t>29-Mar-21</a:t>
+              <a:t>1-Apr-21</a:t>
             </a:fld>
             <a:endParaRPr lang="fr-FR" dirty="0"/>
           </a:p>
@@ -2738,7 +2739,7 @@
           <a:p>
             <a:fld id="{96EB4663-F7A4-4D1C-A9ED-CB0F8B6C7043}" type="datetime5">
               <a:rPr lang="en-US" smtClean="0"/>
-              <a:t>29-Mar-21</a:t>
+              <a:t>1-Apr-21</a:t>
             </a:fld>
             <a:endParaRPr lang="fr-FR" dirty="0"/>
           </a:p>
@@ -2887,7 +2888,7 @@
           <a:p>
             <a:fld id="{6BA86AAF-A50C-4368-8908-D3A4D71BEB6A}" type="datetime5">
               <a:rPr lang="en-US" smtClean="0"/>
-              <a:t>29-Mar-21</a:t>
+              <a:t>1-Apr-21</a:t>
             </a:fld>
             <a:endParaRPr lang="fr-FR" dirty="0"/>
           </a:p>
@@ -3657,7 +3658,7 @@
           <a:p>
             <a:fld id="{49D6B855-A76D-4459-A823-EF680B29CDD3}" type="datetime5">
               <a:rPr lang="en-US" smtClean="0"/>
-              <a:t>29-Mar-21</a:t>
+              <a:t>1-Apr-21</a:t>
             </a:fld>
             <a:endParaRPr lang="fr-FR" dirty="0"/>
           </a:p>
@@ -4388,6 +4389,260 @@
           </a:xfrm>
         </p:spPr>
       </p:pic>
+      <p:sp>
+        <p:nvSpPr>
+          <p:cNvPr id="6" name="Segnaposto contenuto 1">
+            <a:extLst>
+              <a:ext uri="{FF2B5EF4-FFF2-40B4-BE49-F238E27FC236}">
+                <a16:creationId xmlns:a16="http://schemas.microsoft.com/office/drawing/2014/main" id="{CB8A66BB-B7E4-124F-AB66-FDEFF315A2B3}"/>
+              </a:ext>
+            </a:extLst>
+          </p:cNvPr>
+          <p:cNvSpPr txBox="1">
+            <a:spLocks/>
+          </p:cNvSpPr>
+          <p:nvPr/>
+        </p:nvSpPr>
+        <p:spPr>
+          <a:xfrm>
+            <a:off x="6400391" y="1482712"/>
+            <a:ext cx="5719763" cy="4608512"/>
+          </a:xfrm>
+          <a:prstGeom prst="rect">
+            <a:avLst/>
+          </a:prstGeom>
+        </p:spPr>
+        <p:txBody>
+          <a:bodyPr vert="horz" lIns="91440" tIns="45720" rIns="90000" bIns="45720" rtlCol="0">
+            <a:noAutofit/>
+          </a:bodyPr>
+          <a:lstStyle>
+            <a:lvl1pPr marL="261938" indent="-261938" algn="l" defTabSz="914400" rtl="0" eaLnBrk="1" latinLnBrk="0" hangingPunct="1">
+              <a:lnSpc>
+                <a:spcPct val="100000"/>
+              </a:lnSpc>
+              <a:spcBef>
+                <a:spcPts val="1000"/>
+              </a:spcBef>
+              <a:buClr>
+                <a:schemeClr val="tx1"/>
+              </a:buClr>
+              <a:buFont typeface="Arial" panose="020B0604020202020204" pitchFamily="34" charset="0"/>
+              <a:buChar char="•"/>
+              <a:defRPr lang="en-US" sz="2400" kern="1200">
+                <a:solidFill>
+                  <a:schemeClr val="tx1"/>
+                </a:solidFill>
+                <a:latin typeface="+mn-lt"/>
+                <a:ea typeface="+mn-ea"/>
+                <a:cs typeface="+mn-cs"/>
+              </a:defRPr>
+            </a:lvl1pPr>
+            <a:lvl2pPr marL="536575" indent="-266700" algn="l" defTabSz="914400" rtl="0" eaLnBrk="1" latinLnBrk="0" hangingPunct="1">
+              <a:lnSpc>
+                <a:spcPct val="100000"/>
+              </a:lnSpc>
+              <a:spcBef>
+                <a:spcPts val="600"/>
+              </a:spcBef>
+              <a:buClr>
+                <a:schemeClr val="tx1"/>
+              </a:buClr>
+              <a:buFont typeface="Arial" panose="020B0604020202020204" pitchFamily="34" charset="0"/>
+              <a:buChar char="•"/>
+              <a:defRPr lang="en-US" sz="2000" kern="1200">
+                <a:solidFill>
+                  <a:schemeClr val="tx1"/>
+                </a:solidFill>
+                <a:latin typeface="+mn-lt"/>
+                <a:ea typeface="+mn-ea"/>
+                <a:cs typeface="+mn-cs"/>
+              </a:defRPr>
+            </a:lvl2pPr>
+            <a:lvl3pPr marL="812800" indent="-273050" algn="l" defTabSz="914400" rtl="0" eaLnBrk="1" latinLnBrk="0" hangingPunct="1">
+              <a:lnSpc>
+                <a:spcPct val="100000"/>
+              </a:lnSpc>
+              <a:spcBef>
+                <a:spcPts val="600"/>
+              </a:spcBef>
+              <a:buClr>
+                <a:schemeClr val="tx1"/>
+              </a:buClr>
+              <a:buFont typeface="Arial" panose="020B0604020202020204" pitchFamily="34" charset="0"/>
+              <a:buChar char="•"/>
+              <a:defRPr lang="en-US" sz="1800" kern="1200">
+                <a:solidFill>
+                  <a:schemeClr val="tx1"/>
+                </a:solidFill>
+                <a:latin typeface="+mn-lt"/>
+                <a:ea typeface="+mn-ea"/>
+                <a:cs typeface="+mn-cs"/>
+              </a:defRPr>
+            </a:lvl3pPr>
+            <a:lvl4pPr marL="987425" indent="-268288" algn="l" defTabSz="914400" rtl="0" eaLnBrk="1" latinLnBrk="0" hangingPunct="1">
+              <a:lnSpc>
+                <a:spcPct val="100000"/>
+              </a:lnSpc>
+              <a:spcBef>
+                <a:spcPts val="400"/>
+              </a:spcBef>
+              <a:buClr>
+                <a:schemeClr val="tx2"/>
+              </a:buClr>
+              <a:buFont typeface="Arial" panose="020B0604020202020204" pitchFamily="34" charset="0"/>
+              <a:buChar char="•"/>
+              <a:defRPr lang="en-US" sz="1600" kern="1200">
+                <a:solidFill>
+                  <a:schemeClr val="tx2"/>
+                </a:solidFill>
+                <a:latin typeface="+mn-lt"/>
+                <a:ea typeface="+mn-ea"/>
+                <a:cs typeface="+mn-cs"/>
+              </a:defRPr>
+            </a:lvl4pPr>
+            <a:lvl5pPr marL="1160463" indent="-261938" algn="l" defTabSz="914400" rtl="0" eaLnBrk="1" latinLnBrk="0" hangingPunct="1">
+              <a:lnSpc>
+                <a:spcPct val="100000"/>
+              </a:lnSpc>
+              <a:spcBef>
+                <a:spcPts val="400"/>
+              </a:spcBef>
+              <a:buClr>
+                <a:schemeClr val="tx2"/>
+              </a:buClr>
+              <a:buFont typeface="Arial" panose="020B0604020202020204" pitchFamily="34" charset="0"/>
+              <a:buChar char="•"/>
+              <a:defRPr lang="en-US" sz="1600" kern="1200">
+                <a:solidFill>
+                  <a:schemeClr val="tx2"/>
+                </a:solidFill>
+                <a:latin typeface="+mn-lt"/>
+                <a:ea typeface="+mn-ea"/>
+                <a:cs typeface="+mn-cs"/>
+              </a:defRPr>
+            </a:lvl5pPr>
+            <a:lvl6pPr marL="2514600" indent="-228600" algn="l" defTabSz="914400" rtl="0" eaLnBrk="1" latinLnBrk="0" hangingPunct="1">
+              <a:lnSpc>
+                <a:spcPct val="90000"/>
+              </a:lnSpc>
+              <a:spcBef>
+                <a:spcPts val="500"/>
+              </a:spcBef>
+              <a:buFont typeface="Arial" panose="020B0604020202020204" pitchFamily="34" charset="0"/>
+              <a:buChar char="•"/>
+              <a:defRPr sz="1800" kern="1200">
+                <a:solidFill>
+                  <a:schemeClr val="tx1"/>
+                </a:solidFill>
+                <a:latin typeface="+mn-lt"/>
+                <a:ea typeface="+mn-ea"/>
+                <a:cs typeface="+mn-cs"/>
+              </a:defRPr>
+            </a:lvl6pPr>
+            <a:lvl7pPr marL="2971800" indent="-228600" algn="l" defTabSz="914400" rtl="0" eaLnBrk="1" latinLnBrk="0" hangingPunct="1">
+              <a:lnSpc>
+                <a:spcPct val="90000"/>
+              </a:lnSpc>
+              <a:spcBef>
+                <a:spcPts val="500"/>
+              </a:spcBef>
+              <a:buFont typeface="Arial" panose="020B0604020202020204" pitchFamily="34" charset="0"/>
+              <a:buChar char="•"/>
+              <a:defRPr sz="1800" kern="1200">
+                <a:solidFill>
+                  <a:schemeClr val="tx1"/>
+                </a:solidFill>
+                <a:latin typeface="+mn-lt"/>
+                <a:ea typeface="+mn-ea"/>
+                <a:cs typeface="+mn-cs"/>
+              </a:defRPr>
+            </a:lvl7pPr>
+            <a:lvl8pPr marL="3429000" indent="-228600" algn="l" defTabSz="914400" rtl="0" eaLnBrk="1" latinLnBrk="0" hangingPunct="1">
+              <a:lnSpc>
+                <a:spcPct val="90000"/>
+              </a:lnSpc>
+              <a:spcBef>
+                <a:spcPts val="500"/>
+              </a:spcBef>
+              <a:buFont typeface="Arial" panose="020B0604020202020204" pitchFamily="34" charset="0"/>
+              <a:buChar char="•"/>
+              <a:defRPr sz="1800" kern="1200">
+                <a:solidFill>
+                  <a:schemeClr val="tx1"/>
+                </a:solidFill>
+                <a:latin typeface="+mn-lt"/>
+                <a:ea typeface="+mn-ea"/>
+                <a:cs typeface="+mn-cs"/>
+              </a:defRPr>
+            </a:lvl8pPr>
+            <a:lvl9pPr marL="3886200" indent="-228600" algn="l" defTabSz="914400" rtl="0" eaLnBrk="1" latinLnBrk="0" hangingPunct="1">
+              <a:lnSpc>
+                <a:spcPct val="90000"/>
+              </a:lnSpc>
+              <a:spcBef>
+                <a:spcPts val="500"/>
+              </a:spcBef>
+              <a:buFont typeface="Arial" panose="020B0604020202020204" pitchFamily="34" charset="0"/>
+              <a:buChar char="•"/>
+              <a:defRPr sz="1800" kern="1200">
+                <a:solidFill>
+                  <a:schemeClr val="tx1"/>
+                </a:solidFill>
+                <a:latin typeface="+mn-lt"/>
+                <a:ea typeface="+mn-ea"/>
+                <a:cs typeface="+mn-cs"/>
+              </a:defRPr>
+            </a:lvl9pPr>
+          </a:lstStyle>
+          <a:p>
+            <a:r>
+              <a:rPr lang="en-GB" dirty="0" err="1"/>
+              <a:t>XNORNet</a:t>
+            </a:r>
+            <a:r>
+              <a:rPr lang="en-GB" dirty="0"/>
+              <a:t>		</a:t>
+            </a:r>
+          </a:p>
+        </p:txBody>
+      </p:sp>
+      <p:pic>
+        <p:nvPicPr>
+          <p:cNvPr id="7" name="Immagine 6" descr="Immagine che contiene testo&#10;&#10;Descrizione generata automaticamente">
+            <a:extLst>
+              <a:ext uri="{FF2B5EF4-FFF2-40B4-BE49-F238E27FC236}">
+                <a16:creationId xmlns:a16="http://schemas.microsoft.com/office/drawing/2014/main" id="{DF02711A-59C8-0A4E-BBC6-61676F6CB36B}"/>
+              </a:ext>
+            </a:extLst>
+          </p:cNvPr>
+          <p:cNvPicPr>
+            <a:picLocks noChangeAspect="1"/>
+          </p:cNvPicPr>
+          <p:nvPr/>
+        </p:nvPicPr>
+        <p:blipFill>
+          <a:blip r:embed="rId3">
+            <a:extLst>
+              <a:ext uri="{28A0092B-C50C-407E-A947-70E740481C1C}">
+                <a14:useLocalDpi xmlns:a14="http://schemas.microsoft.com/office/drawing/2010/main" val="0"/>
+              </a:ext>
+            </a:extLst>
+          </a:blip>
+          <a:stretch>
+            <a:fillRect/>
+          </a:stretch>
+        </p:blipFill>
+        <p:spPr>
+          <a:xfrm>
+            <a:off x="6088582" y="2097802"/>
+            <a:ext cx="5932683" cy="2662397"/>
+          </a:xfrm>
+          <a:prstGeom prst="rect">
+            <a:avLst/>
+          </a:prstGeom>
+        </p:spPr>
+      </p:pic>
     </p:spTree>
     <p:extLst>
       <p:ext uri="{BB962C8B-B14F-4D97-AF65-F5344CB8AC3E}">
@@ -4402,6 +4657,368 @@
 </file>
 
 <file path=ppt/slides/slide11.xml><?xml version="1.0" encoding="utf-8"?>
+<p:sld xmlns:a="http://schemas.openxmlformats.org/drawingml/2006/main" xmlns:r="http://schemas.openxmlformats.org/officeDocument/2006/relationships" xmlns:p="http://schemas.openxmlformats.org/presentationml/2006/main">
+  <p:cSld>
+    <p:spTree>
+      <p:nvGrpSpPr>
+        <p:cNvPr id="1" name=""/>
+        <p:cNvGrpSpPr/>
+        <p:nvPr/>
+      </p:nvGrpSpPr>
+      <p:grpSpPr>
+        <a:xfrm>
+          <a:off x="0" y="0"/>
+          <a:ext cx="0" cy="0"/>
+          <a:chOff x="0" y="0"/>
+          <a:chExt cx="0" cy="0"/>
+        </a:xfrm>
+      </p:grpSpPr>
+      <p:sp>
+        <p:nvSpPr>
+          <p:cNvPr id="2" name="Segnaposto contenuto 1">
+            <a:extLst>
+              <a:ext uri="{FF2B5EF4-FFF2-40B4-BE49-F238E27FC236}">
+                <a16:creationId xmlns:a16="http://schemas.microsoft.com/office/drawing/2014/main" id="{ED5054BD-1795-C145-A8DA-CDAE67545BED}"/>
+              </a:ext>
+            </a:extLst>
+          </p:cNvPr>
+          <p:cNvSpPr>
+            <a:spLocks noGrp="1"/>
+          </p:cNvSpPr>
+          <p:nvPr>
+            <p:ph sz="half" idx="1"/>
+          </p:nvPr>
+        </p:nvSpPr>
+        <p:spPr/>
+        <p:txBody>
+          <a:bodyPr/>
+          <a:lstStyle/>
+          <a:p>
+            <a:r>
+              <a:rPr lang="en-GB" dirty="0"/>
+              <a:t>Real to Binary Net		</a:t>
+            </a:r>
+          </a:p>
+        </p:txBody>
+      </p:sp>
+      <p:sp>
+        <p:nvSpPr>
+          <p:cNvPr id="4" name="Titolo 3">
+            <a:extLst>
+              <a:ext uri="{FF2B5EF4-FFF2-40B4-BE49-F238E27FC236}">
+                <a16:creationId xmlns:a16="http://schemas.microsoft.com/office/drawing/2014/main" id="{03FC87DB-6BA8-2647-917A-4912C4F6A5A4}"/>
+              </a:ext>
+            </a:extLst>
+          </p:cNvPr>
+          <p:cNvSpPr>
+            <a:spLocks noGrp="1"/>
+          </p:cNvSpPr>
+          <p:nvPr>
+            <p:ph type="title"/>
+          </p:nvPr>
+        </p:nvSpPr>
+        <p:spPr/>
+        <p:txBody>
+          <a:bodyPr/>
+          <a:lstStyle/>
+          <a:p>
+            <a:r>
+              <a:rPr lang="en-GB" dirty="0"/>
+              <a:t>Network Summary</a:t>
+            </a:r>
+          </a:p>
+        </p:txBody>
+      </p:sp>
+      <p:sp>
+        <p:nvSpPr>
+          <p:cNvPr id="5" name="Segnaposto numero diapositiva 4">
+            <a:extLst>
+              <a:ext uri="{FF2B5EF4-FFF2-40B4-BE49-F238E27FC236}">
+                <a16:creationId xmlns:a16="http://schemas.microsoft.com/office/drawing/2014/main" id="{66916DDB-4CCC-E04F-8CE4-AC561CE5FF77}"/>
+              </a:ext>
+            </a:extLst>
+          </p:cNvPr>
+          <p:cNvSpPr>
+            <a:spLocks noGrp="1"/>
+          </p:cNvSpPr>
+          <p:nvPr>
+            <p:ph type="sldNum" sz="quarter" idx="12"/>
+          </p:nvPr>
+        </p:nvSpPr>
+        <p:spPr/>
+        <p:txBody>
+          <a:bodyPr/>
+          <a:lstStyle/>
+          <a:p>
+            <a:fld id="{62A42E78-4FE3-4E16-9FB9-64A349BFE3FC}" type="slidenum">
+              <a:rPr lang="fr-FR" smtClean="0"/>
+              <a:pPr/>
+              <a:t>11</a:t>
+            </a:fld>
+            <a:endParaRPr lang="fr-FR" dirty="0"/>
+          </a:p>
+        </p:txBody>
+      </p:sp>
+      <p:sp>
+        <p:nvSpPr>
+          <p:cNvPr id="6" name="Segnaposto contenuto 1">
+            <a:extLst>
+              <a:ext uri="{FF2B5EF4-FFF2-40B4-BE49-F238E27FC236}">
+                <a16:creationId xmlns:a16="http://schemas.microsoft.com/office/drawing/2014/main" id="{CB8A66BB-B7E4-124F-AB66-FDEFF315A2B3}"/>
+              </a:ext>
+            </a:extLst>
+          </p:cNvPr>
+          <p:cNvSpPr txBox="1">
+            <a:spLocks/>
+          </p:cNvSpPr>
+          <p:nvPr/>
+        </p:nvSpPr>
+        <p:spPr>
+          <a:xfrm>
+            <a:off x="6400391" y="1482712"/>
+            <a:ext cx="5719763" cy="4608512"/>
+          </a:xfrm>
+          <a:prstGeom prst="rect">
+            <a:avLst/>
+          </a:prstGeom>
+        </p:spPr>
+        <p:txBody>
+          <a:bodyPr vert="horz" lIns="91440" tIns="45720" rIns="90000" bIns="45720" rtlCol="0">
+            <a:noAutofit/>
+          </a:bodyPr>
+          <a:lstStyle>
+            <a:lvl1pPr marL="261938" indent="-261938" algn="l" defTabSz="914400" rtl="0" eaLnBrk="1" latinLnBrk="0" hangingPunct="1">
+              <a:lnSpc>
+                <a:spcPct val="100000"/>
+              </a:lnSpc>
+              <a:spcBef>
+                <a:spcPts val="1000"/>
+              </a:spcBef>
+              <a:buClr>
+                <a:schemeClr val="tx1"/>
+              </a:buClr>
+              <a:buFont typeface="Arial" panose="020B0604020202020204" pitchFamily="34" charset="0"/>
+              <a:buChar char="•"/>
+              <a:defRPr lang="en-US" sz="2400" kern="1200">
+                <a:solidFill>
+                  <a:schemeClr val="tx1"/>
+                </a:solidFill>
+                <a:latin typeface="+mn-lt"/>
+                <a:ea typeface="+mn-ea"/>
+                <a:cs typeface="+mn-cs"/>
+              </a:defRPr>
+            </a:lvl1pPr>
+            <a:lvl2pPr marL="536575" indent="-266700" algn="l" defTabSz="914400" rtl="0" eaLnBrk="1" latinLnBrk="0" hangingPunct="1">
+              <a:lnSpc>
+                <a:spcPct val="100000"/>
+              </a:lnSpc>
+              <a:spcBef>
+                <a:spcPts val="600"/>
+              </a:spcBef>
+              <a:buClr>
+                <a:schemeClr val="tx1"/>
+              </a:buClr>
+              <a:buFont typeface="Arial" panose="020B0604020202020204" pitchFamily="34" charset="0"/>
+              <a:buChar char="•"/>
+              <a:defRPr lang="en-US" sz="2000" kern="1200">
+                <a:solidFill>
+                  <a:schemeClr val="tx1"/>
+                </a:solidFill>
+                <a:latin typeface="+mn-lt"/>
+                <a:ea typeface="+mn-ea"/>
+                <a:cs typeface="+mn-cs"/>
+              </a:defRPr>
+            </a:lvl2pPr>
+            <a:lvl3pPr marL="812800" indent="-273050" algn="l" defTabSz="914400" rtl="0" eaLnBrk="1" latinLnBrk="0" hangingPunct="1">
+              <a:lnSpc>
+                <a:spcPct val="100000"/>
+              </a:lnSpc>
+              <a:spcBef>
+                <a:spcPts val="600"/>
+              </a:spcBef>
+              <a:buClr>
+                <a:schemeClr val="tx1"/>
+              </a:buClr>
+              <a:buFont typeface="Arial" panose="020B0604020202020204" pitchFamily="34" charset="0"/>
+              <a:buChar char="•"/>
+              <a:defRPr lang="en-US" sz="1800" kern="1200">
+                <a:solidFill>
+                  <a:schemeClr val="tx1"/>
+                </a:solidFill>
+                <a:latin typeface="+mn-lt"/>
+                <a:ea typeface="+mn-ea"/>
+                <a:cs typeface="+mn-cs"/>
+              </a:defRPr>
+            </a:lvl3pPr>
+            <a:lvl4pPr marL="987425" indent="-268288" algn="l" defTabSz="914400" rtl="0" eaLnBrk="1" latinLnBrk="0" hangingPunct="1">
+              <a:lnSpc>
+                <a:spcPct val="100000"/>
+              </a:lnSpc>
+              <a:spcBef>
+                <a:spcPts val="400"/>
+              </a:spcBef>
+              <a:buClr>
+                <a:schemeClr val="tx2"/>
+              </a:buClr>
+              <a:buFont typeface="Arial" panose="020B0604020202020204" pitchFamily="34" charset="0"/>
+              <a:buChar char="•"/>
+              <a:defRPr lang="en-US" sz="1600" kern="1200">
+                <a:solidFill>
+                  <a:schemeClr val="tx2"/>
+                </a:solidFill>
+                <a:latin typeface="+mn-lt"/>
+                <a:ea typeface="+mn-ea"/>
+                <a:cs typeface="+mn-cs"/>
+              </a:defRPr>
+            </a:lvl4pPr>
+            <a:lvl5pPr marL="1160463" indent="-261938" algn="l" defTabSz="914400" rtl="0" eaLnBrk="1" latinLnBrk="0" hangingPunct="1">
+              <a:lnSpc>
+                <a:spcPct val="100000"/>
+              </a:lnSpc>
+              <a:spcBef>
+                <a:spcPts val="400"/>
+              </a:spcBef>
+              <a:buClr>
+                <a:schemeClr val="tx2"/>
+              </a:buClr>
+              <a:buFont typeface="Arial" panose="020B0604020202020204" pitchFamily="34" charset="0"/>
+              <a:buChar char="•"/>
+              <a:defRPr lang="en-US" sz="1600" kern="1200">
+                <a:solidFill>
+                  <a:schemeClr val="tx2"/>
+                </a:solidFill>
+                <a:latin typeface="+mn-lt"/>
+                <a:ea typeface="+mn-ea"/>
+                <a:cs typeface="+mn-cs"/>
+              </a:defRPr>
+            </a:lvl5pPr>
+            <a:lvl6pPr marL="2514600" indent="-228600" algn="l" defTabSz="914400" rtl="0" eaLnBrk="1" latinLnBrk="0" hangingPunct="1">
+              <a:lnSpc>
+                <a:spcPct val="90000"/>
+              </a:lnSpc>
+              <a:spcBef>
+                <a:spcPts val="500"/>
+              </a:spcBef>
+              <a:buFont typeface="Arial" panose="020B0604020202020204" pitchFamily="34" charset="0"/>
+              <a:buChar char="•"/>
+              <a:defRPr sz="1800" kern="1200">
+                <a:solidFill>
+                  <a:schemeClr val="tx1"/>
+                </a:solidFill>
+                <a:latin typeface="+mn-lt"/>
+                <a:ea typeface="+mn-ea"/>
+                <a:cs typeface="+mn-cs"/>
+              </a:defRPr>
+            </a:lvl6pPr>
+            <a:lvl7pPr marL="2971800" indent="-228600" algn="l" defTabSz="914400" rtl="0" eaLnBrk="1" latinLnBrk="0" hangingPunct="1">
+              <a:lnSpc>
+                <a:spcPct val="90000"/>
+              </a:lnSpc>
+              <a:spcBef>
+                <a:spcPts val="500"/>
+              </a:spcBef>
+              <a:buFont typeface="Arial" panose="020B0604020202020204" pitchFamily="34" charset="0"/>
+              <a:buChar char="•"/>
+              <a:defRPr sz="1800" kern="1200">
+                <a:solidFill>
+                  <a:schemeClr val="tx1"/>
+                </a:solidFill>
+                <a:latin typeface="+mn-lt"/>
+                <a:ea typeface="+mn-ea"/>
+                <a:cs typeface="+mn-cs"/>
+              </a:defRPr>
+            </a:lvl7pPr>
+            <a:lvl8pPr marL="3429000" indent="-228600" algn="l" defTabSz="914400" rtl="0" eaLnBrk="1" latinLnBrk="0" hangingPunct="1">
+              <a:lnSpc>
+                <a:spcPct val="90000"/>
+              </a:lnSpc>
+              <a:spcBef>
+                <a:spcPts val="500"/>
+              </a:spcBef>
+              <a:buFont typeface="Arial" panose="020B0604020202020204" pitchFamily="34" charset="0"/>
+              <a:buChar char="•"/>
+              <a:defRPr sz="1800" kern="1200">
+                <a:solidFill>
+                  <a:schemeClr val="tx1"/>
+                </a:solidFill>
+                <a:latin typeface="+mn-lt"/>
+                <a:ea typeface="+mn-ea"/>
+                <a:cs typeface="+mn-cs"/>
+              </a:defRPr>
+            </a:lvl8pPr>
+            <a:lvl9pPr marL="3886200" indent="-228600" algn="l" defTabSz="914400" rtl="0" eaLnBrk="1" latinLnBrk="0" hangingPunct="1">
+              <a:lnSpc>
+                <a:spcPct val="90000"/>
+              </a:lnSpc>
+              <a:spcBef>
+                <a:spcPts val="500"/>
+              </a:spcBef>
+              <a:buFont typeface="Arial" panose="020B0604020202020204" pitchFamily="34" charset="0"/>
+              <a:buChar char="•"/>
+              <a:defRPr sz="1800" kern="1200">
+                <a:solidFill>
+                  <a:schemeClr val="tx1"/>
+                </a:solidFill>
+                <a:latin typeface="+mn-lt"/>
+                <a:ea typeface="+mn-ea"/>
+                <a:cs typeface="+mn-cs"/>
+              </a:defRPr>
+            </a:lvl9pPr>
+          </a:lstStyle>
+          <a:p>
+            <a:endParaRPr lang="en-GB" dirty="0"/>
+          </a:p>
+        </p:txBody>
+      </p:sp>
+      <p:pic>
+        <p:nvPicPr>
+          <p:cNvPr id="10" name="Segnaposto contenuto 9" descr="Immagine che contiene testo&#10;&#10;Descrizione generata automaticamente">
+            <a:extLst>
+              <a:ext uri="{FF2B5EF4-FFF2-40B4-BE49-F238E27FC236}">
+                <a16:creationId xmlns:a16="http://schemas.microsoft.com/office/drawing/2014/main" id="{D4272654-9A12-2540-AD7B-C3DBE259C444}"/>
+              </a:ext>
+            </a:extLst>
+          </p:cNvPr>
+          <p:cNvPicPr>
+            <a:picLocks noGrp="1" noChangeAspect="1"/>
+          </p:cNvPicPr>
+          <p:nvPr>
+            <p:ph sz="half" idx="2"/>
+          </p:nvPr>
+        </p:nvPicPr>
+        <p:blipFill>
+          <a:blip r:embed="rId2">
+            <a:extLst>
+              <a:ext uri="{28A0092B-C50C-407E-A947-70E740481C1C}">
+                <a14:useLocalDpi xmlns:a14="http://schemas.microsoft.com/office/drawing/2010/main" val="0"/>
+              </a:ext>
+            </a:extLst>
+          </a:blip>
+          <a:stretch>
+            <a:fillRect/>
+          </a:stretch>
+        </p:blipFill>
+        <p:spPr>
+          <a:xfrm>
+            <a:off x="300036" y="2145577"/>
+            <a:ext cx="5719763" cy="2566845"/>
+          </a:xfrm>
+        </p:spPr>
+      </p:pic>
+    </p:spTree>
+    <p:extLst>
+      <p:ext uri="{BB962C8B-B14F-4D97-AF65-F5344CB8AC3E}">
+        <p14:creationId xmlns:p14="http://schemas.microsoft.com/office/powerpoint/2010/main" val="2605276917"/>
+      </p:ext>
+    </p:extLst>
+  </p:cSld>
+  <p:clrMapOvr>
+    <a:masterClrMapping/>
+  </p:clrMapOvr>
+</p:sld>
+</file>
+
+<file path=ppt/slides/slide12.xml><?xml version="1.0" encoding="utf-8"?>
 <p:sld xmlns:a="http://schemas.openxmlformats.org/drawingml/2006/main" xmlns:r="http://schemas.openxmlformats.org/officeDocument/2006/relationships" xmlns:p="http://schemas.openxmlformats.org/presentationml/2006/main">
   <p:cSld>
     <p:spTree>
@@ -4646,7 +5263,7 @@
             <a:fld id="{62A42E78-4FE3-4E16-9FB9-64A349BFE3FC}" type="slidenum">
               <a:rPr lang="fr-FR" smtClean="0"/>
               <a:pPr/>
-              <a:t>11</a:t>
+              <a:t>12</a:t>
             </a:fld>
             <a:endParaRPr lang="fr-FR" dirty="0"/>
           </a:p>
@@ -4656,189 +5273,6 @@
     <p:extLst>
       <p:ext uri="{BB962C8B-B14F-4D97-AF65-F5344CB8AC3E}">
         <p14:creationId xmlns:p14="http://schemas.microsoft.com/office/powerpoint/2010/main" val="1176882638"/>
-      </p:ext>
-    </p:extLst>
-  </p:cSld>
-  <p:clrMapOvr>
-    <a:masterClrMapping/>
-  </p:clrMapOvr>
-</p:sld>
-</file>
-
-<file path=ppt/slides/slide12.xml><?xml version="1.0" encoding="utf-8"?>
-<p:sld xmlns:a="http://schemas.openxmlformats.org/drawingml/2006/main" xmlns:r="http://schemas.openxmlformats.org/officeDocument/2006/relationships" xmlns:p="http://schemas.openxmlformats.org/presentationml/2006/main">
-  <p:cSld>
-    <p:spTree>
-      <p:nvGrpSpPr>
-        <p:cNvPr id="1" name=""/>
-        <p:cNvGrpSpPr/>
-        <p:nvPr/>
-      </p:nvGrpSpPr>
-      <p:grpSpPr>
-        <a:xfrm>
-          <a:off x="0" y="0"/>
-          <a:ext cx="0" cy="0"/>
-          <a:chOff x="0" y="0"/>
-          <a:chExt cx="0" cy="0"/>
-        </a:xfrm>
-      </p:grpSpPr>
-      <p:sp>
-        <p:nvSpPr>
-          <p:cNvPr id="2" name="Segnaposto contenuto 1">
-            <a:extLst>
-              <a:ext uri="{FF2B5EF4-FFF2-40B4-BE49-F238E27FC236}">
-                <a16:creationId xmlns:a16="http://schemas.microsoft.com/office/drawing/2014/main" id="{29C22E96-D705-6B45-8FBA-F0EB5EB897BF}"/>
-              </a:ext>
-            </a:extLst>
-          </p:cNvPr>
-          <p:cNvSpPr>
-            <a:spLocks noGrp="1"/>
-          </p:cNvSpPr>
-          <p:nvPr>
-            <p:ph idx="1"/>
-          </p:nvPr>
-        </p:nvSpPr>
-        <p:spPr/>
-        <p:txBody>
-          <a:bodyPr/>
-          <a:lstStyle/>
-          <a:p>
-            <a:r>
-              <a:rPr lang="en-GB" dirty="0"/>
-              <a:t>Here the steps to compare ”how well” </a:t>
-            </a:r>
-            <a:r>
-              <a:rPr lang="en-GB" dirty="0" err="1"/>
-              <a:t>qkeras</a:t>
-            </a:r>
-            <a:r>
-              <a:rPr lang="en-GB" dirty="0"/>
-              <a:t> network replicates the </a:t>
-            </a:r>
-            <a:r>
-              <a:rPr lang="en-GB" dirty="0" err="1"/>
-              <a:t>larq</a:t>
-            </a:r>
-            <a:r>
-              <a:rPr lang="en-GB" dirty="0"/>
-              <a:t> ones:</a:t>
-            </a:r>
-          </a:p>
-          <a:p>
-            <a:pPr marL="0" indent="0">
-              <a:buNone/>
-            </a:pPr>
-            <a:endParaRPr lang="en-GB" dirty="0"/>
-          </a:p>
-          <a:p>
-            <a:pPr lvl="1"/>
-            <a:r>
-              <a:rPr lang="en-GB" dirty="0"/>
-              <a:t>Load 2000 sample from the </a:t>
-            </a:r>
-            <a:r>
-              <a:rPr lang="en-GB" dirty="0" err="1"/>
-              <a:t>imageNET</a:t>
-            </a:r>
-            <a:r>
-              <a:rPr lang="en-GB" dirty="0"/>
-              <a:t> dataset</a:t>
-            </a:r>
-          </a:p>
-          <a:p>
-            <a:pPr marL="269875" lvl="1" indent="0">
-              <a:buNone/>
-            </a:pPr>
-            <a:endParaRPr lang="en-GB" dirty="0"/>
-          </a:p>
-          <a:p>
-            <a:pPr lvl="1"/>
-            <a:r>
-              <a:rPr lang="en-GB" dirty="0"/>
-              <a:t>Resize the images to (224,224,3)</a:t>
-            </a:r>
-          </a:p>
-          <a:p>
-            <a:pPr marL="269875" lvl="1" indent="0">
-              <a:buNone/>
-            </a:pPr>
-            <a:endParaRPr lang="en-GB" dirty="0"/>
-          </a:p>
-          <a:p>
-            <a:pPr lvl="1"/>
-            <a:r>
-              <a:rPr lang="en-GB" dirty="0"/>
-              <a:t>Count how many times the two network gives different class prediction</a:t>
-            </a:r>
-          </a:p>
-        </p:txBody>
-      </p:sp>
-      <p:sp>
-        <p:nvSpPr>
-          <p:cNvPr id="3" name="Titolo 2">
-            <a:extLst>
-              <a:ext uri="{FF2B5EF4-FFF2-40B4-BE49-F238E27FC236}">
-                <a16:creationId xmlns:a16="http://schemas.microsoft.com/office/drawing/2014/main" id="{04F219E6-026F-404C-87C9-597D5E87E07D}"/>
-              </a:ext>
-            </a:extLst>
-          </p:cNvPr>
-          <p:cNvSpPr>
-            <a:spLocks noGrp="1"/>
-          </p:cNvSpPr>
-          <p:nvPr>
-            <p:ph type="title"/>
-          </p:nvPr>
-        </p:nvSpPr>
-        <p:spPr/>
-        <p:txBody>
-          <a:bodyPr/>
-          <a:lstStyle/>
-          <a:p>
-            <a:r>
-              <a:rPr lang="en-GB" dirty="0" err="1"/>
-              <a:t>ImageNET</a:t>
-            </a:r>
-            <a:r>
-              <a:rPr lang="en-GB" dirty="0"/>
-              <a:t> Test</a:t>
-            </a:r>
-          </a:p>
-        </p:txBody>
-      </p:sp>
-      <p:sp>
-        <p:nvSpPr>
-          <p:cNvPr id="4" name="Segnaposto numero diapositiva 3">
-            <a:extLst>
-              <a:ext uri="{FF2B5EF4-FFF2-40B4-BE49-F238E27FC236}">
-                <a16:creationId xmlns:a16="http://schemas.microsoft.com/office/drawing/2014/main" id="{C46B02A9-5EAF-C24B-AC58-5F2F03F0C4C2}"/>
-              </a:ext>
-            </a:extLst>
-          </p:cNvPr>
-          <p:cNvSpPr>
-            <a:spLocks noGrp="1"/>
-          </p:cNvSpPr>
-          <p:nvPr>
-            <p:ph type="sldNum" sz="quarter" idx="12"/>
-          </p:nvPr>
-        </p:nvSpPr>
-        <p:spPr/>
-        <p:txBody>
-          <a:bodyPr/>
-          <a:lstStyle/>
-          <a:p>
-            <a:fld id="{62A42E78-4FE3-4E16-9FB9-64A349BFE3FC}" type="slidenum">
-              <a:rPr lang="fr-FR" smtClean="0"/>
-              <a:pPr/>
-              <a:t>12</a:t>
-            </a:fld>
-            <a:endParaRPr lang="fr-FR" dirty="0"/>
-          </a:p>
-        </p:txBody>
-      </p:sp>
-    </p:spTree>
-    <p:extLst>
-      <p:ext uri="{BB962C8B-B14F-4D97-AF65-F5344CB8AC3E}">
-        <p14:creationId xmlns:p14="http://schemas.microsoft.com/office/powerpoint/2010/main" val="2574214331"/>
       </p:ext>
     </p:extLst>
   </p:cSld>
@@ -4867,10 +5301,101 @@
       </p:grpSpPr>
       <p:sp>
         <p:nvSpPr>
+          <p:cNvPr id="2" name="Segnaposto contenuto 1">
+            <a:extLst>
+              <a:ext uri="{FF2B5EF4-FFF2-40B4-BE49-F238E27FC236}">
+                <a16:creationId xmlns:a16="http://schemas.microsoft.com/office/drawing/2014/main" id="{29C22E96-D705-6B45-8FBA-F0EB5EB897BF}"/>
+              </a:ext>
+            </a:extLst>
+          </p:cNvPr>
+          <p:cNvSpPr>
+            <a:spLocks noGrp="1"/>
+          </p:cNvSpPr>
+          <p:nvPr>
+            <p:ph idx="1"/>
+          </p:nvPr>
+        </p:nvSpPr>
+        <p:spPr/>
+        <p:txBody>
+          <a:bodyPr/>
+          <a:lstStyle/>
+          <a:p>
+            <a:r>
+              <a:rPr lang="en-GB" dirty="0"/>
+              <a:t>Here the steps to compare ”how well” </a:t>
+            </a:r>
+            <a:r>
+              <a:rPr lang="en-GB" dirty="0" err="1"/>
+              <a:t>qkeras</a:t>
+            </a:r>
+            <a:r>
+              <a:rPr lang="en-GB" dirty="0"/>
+              <a:t> network replicates the </a:t>
+            </a:r>
+            <a:r>
+              <a:rPr lang="en-GB" dirty="0" err="1"/>
+              <a:t>larq</a:t>
+            </a:r>
+            <a:r>
+              <a:rPr lang="en-GB" dirty="0"/>
+              <a:t> ones:</a:t>
+            </a:r>
+          </a:p>
+          <a:p>
+            <a:pPr marL="0" indent="0">
+              <a:buNone/>
+            </a:pPr>
+            <a:endParaRPr lang="en-GB" dirty="0"/>
+          </a:p>
+          <a:p>
+            <a:pPr lvl="1"/>
+            <a:r>
+              <a:rPr lang="en-GB" dirty="0"/>
+              <a:t>Load 2000 sample from the </a:t>
+            </a:r>
+            <a:r>
+              <a:rPr lang="en-GB" dirty="0" err="1"/>
+              <a:t>imageNET</a:t>
+            </a:r>
+            <a:r>
+              <a:rPr lang="en-GB" dirty="0"/>
+              <a:t> dataset</a:t>
+            </a:r>
+          </a:p>
+          <a:p>
+            <a:pPr marL="269875" lvl="1" indent="0">
+              <a:buNone/>
+            </a:pPr>
+            <a:endParaRPr lang="en-GB" dirty="0"/>
+          </a:p>
+          <a:p>
+            <a:pPr lvl="1"/>
+            <a:r>
+              <a:rPr lang="en-GB" dirty="0"/>
+              <a:t>Resize the images to (224,224,3)</a:t>
+            </a:r>
+          </a:p>
+          <a:p>
+            <a:pPr marL="269875" lvl="1" indent="0">
+              <a:buNone/>
+            </a:pPr>
+            <a:endParaRPr lang="en-GB" dirty="0"/>
+          </a:p>
+          <a:p>
+            <a:pPr lvl="1"/>
+            <a:r>
+              <a:rPr lang="en-GB" dirty="0"/>
+              <a:t>Count how many times the two network gives different class prediction</a:t>
+            </a:r>
+          </a:p>
+        </p:txBody>
+      </p:sp>
+      <p:sp>
+        <p:nvSpPr>
           <p:cNvPr id="3" name="Titolo 2">
             <a:extLst>
               <a:ext uri="{FF2B5EF4-FFF2-40B4-BE49-F238E27FC236}">
-                <a16:creationId xmlns:a16="http://schemas.microsoft.com/office/drawing/2014/main" id="{F455835F-A8B7-C54F-A49E-2C7D0D2D0616}"/>
+                <a16:creationId xmlns:a16="http://schemas.microsoft.com/office/drawing/2014/main" id="{04F219E6-026F-404C-87C9-597D5E87E07D}"/>
               </a:ext>
             </a:extLst>
           </p:cNvPr>
@@ -4887,8 +5412,12 @@
           <a:lstStyle/>
           <a:p>
             <a:r>
+              <a:rPr lang="en-GB" dirty="0" err="1"/>
+              <a:t>ImageNET</a:t>
+            </a:r>
+            <a:r>
               <a:rPr lang="en-GB" dirty="0"/>
-              <a:t>Results</a:t>
+              <a:t> Test</a:t>
             </a:r>
           </a:p>
         </p:txBody>
@@ -4898,7 +5427,7 @@
           <p:cNvPr id="4" name="Segnaposto numero diapositiva 3">
             <a:extLst>
               <a:ext uri="{FF2B5EF4-FFF2-40B4-BE49-F238E27FC236}">
-                <a16:creationId xmlns:a16="http://schemas.microsoft.com/office/drawing/2014/main" id="{F5D4C0BF-7672-384D-8CDF-0BE247B3F2BB}"/>
+                <a16:creationId xmlns:a16="http://schemas.microsoft.com/office/drawing/2014/main" id="{C46B02A9-5EAF-C24B-AC58-5F2F03F0C4C2}"/>
               </a:ext>
             </a:extLst>
           </p:cNvPr>
@@ -4923,6 +5452,94 @@
           </a:p>
         </p:txBody>
       </p:sp>
+    </p:spTree>
+    <p:extLst>
+      <p:ext uri="{BB962C8B-B14F-4D97-AF65-F5344CB8AC3E}">
+        <p14:creationId xmlns:p14="http://schemas.microsoft.com/office/powerpoint/2010/main" val="2574214331"/>
+      </p:ext>
+    </p:extLst>
+  </p:cSld>
+  <p:clrMapOvr>
+    <a:masterClrMapping/>
+  </p:clrMapOvr>
+</p:sld>
+</file>
+
+<file path=ppt/slides/slide14.xml><?xml version="1.0" encoding="utf-8"?>
+<p:sld xmlns:a="http://schemas.openxmlformats.org/drawingml/2006/main" xmlns:r="http://schemas.openxmlformats.org/officeDocument/2006/relationships" xmlns:p="http://schemas.openxmlformats.org/presentationml/2006/main">
+  <p:cSld>
+    <p:spTree>
+      <p:nvGrpSpPr>
+        <p:cNvPr id="1" name=""/>
+        <p:cNvGrpSpPr/>
+        <p:nvPr/>
+      </p:nvGrpSpPr>
+      <p:grpSpPr>
+        <a:xfrm>
+          <a:off x="0" y="0"/>
+          <a:ext cx="0" cy="0"/>
+          <a:chOff x="0" y="0"/>
+          <a:chExt cx="0" cy="0"/>
+        </a:xfrm>
+      </p:grpSpPr>
+      <p:sp>
+        <p:nvSpPr>
+          <p:cNvPr id="3" name="Titolo 2">
+            <a:extLst>
+              <a:ext uri="{FF2B5EF4-FFF2-40B4-BE49-F238E27FC236}">
+                <a16:creationId xmlns:a16="http://schemas.microsoft.com/office/drawing/2014/main" id="{F455835F-A8B7-C54F-A49E-2C7D0D2D0616}"/>
+              </a:ext>
+            </a:extLst>
+          </p:cNvPr>
+          <p:cNvSpPr>
+            <a:spLocks noGrp="1"/>
+          </p:cNvSpPr>
+          <p:nvPr>
+            <p:ph type="title"/>
+          </p:nvPr>
+        </p:nvSpPr>
+        <p:spPr/>
+        <p:txBody>
+          <a:bodyPr/>
+          <a:lstStyle/>
+          <a:p>
+            <a:r>
+              <a:rPr lang="en-GB" dirty="0"/>
+              <a:t>Results</a:t>
+            </a:r>
+          </a:p>
+        </p:txBody>
+      </p:sp>
+      <p:sp>
+        <p:nvSpPr>
+          <p:cNvPr id="4" name="Segnaposto numero diapositiva 3">
+            <a:extLst>
+              <a:ext uri="{FF2B5EF4-FFF2-40B4-BE49-F238E27FC236}">
+                <a16:creationId xmlns:a16="http://schemas.microsoft.com/office/drawing/2014/main" id="{F5D4C0BF-7672-384D-8CDF-0BE247B3F2BB}"/>
+              </a:ext>
+            </a:extLst>
+          </p:cNvPr>
+          <p:cNvSpPr>
+            <a:spLocks noGrp="1"/>
+          </p:cNvSpPr>
+          <p:nvPr>
+            <p:ph type="sldNum" sz="quarter" idx="12"/>
+          </p:nvPr>
+        </p:nvSpPr>
+        <p:spPr/>
+        <p:txBody>
+          <a:bodyPr/>
+          <a:lstStyle/>
+          <a:p>
+            <a:fld id="{62A42E78-4FE3-4E16-9FB9-64A349BFE3FC}" type="slidenum">
+              <a:rPr lang="fr-FR" smtClean="0"/>
+              <a:pPr/>
+              <a:t>14</a:t>
+            </a:fld>
+            <a:endParaRPr lang="fr-FR" dirty="0"/>
+          </a:p>
+        </p:txBody>
+      </p:sp>
       <p:graphicFrame>
         <p:nvGraphicFramePr>
           <p:cNvPr id="8" name="Tabella 8">
@@ -4938,14 +5555,14 @@
           <p:nvPr>
             <p:extLst>
               <p:ext uri="{D42A27DB-BD31-4B8C-83A1-F6EECF244321}">
-                <p14:modId xmlns:p14="http://schemas.microsoft.com/office/powerpoint/2010/main" val="3856797541"/>
+                <p14:modId xmlns:p14="http://schemas.microsoft.com/office/powerpoint/2010/main" val="490289766"/>
               </p:ext>
             </p:extLst>
           </p:nvPr>
         </p:nvGraphicFramePr>
         <p:xfrm>
-          <a:off x="282804" y="1304924"/>
-          <a:ext cx="11322410" cy="4066019"/>
+          <a:off x="434795" y="1060414"/>
+          <a:ext cx="11322410" cy="4737171"/>
         </p:xfrm>
         <a:graphic>
           <a:graphicData uri="http://schemas.openxmlformats.org/drawingml/2006/table">
@@ -5875,6 +6492,181 @@
                   </a:ext>
                 </a:extLst>
               </a:tr>
+              <a:tr h="335576">
+                <a:tc>
+                  <a:txBody>
+                    <a:bodyPr/>
+                    <a:lstStyle/>
+                    <a:p>
+                      <a:pPr marL="0" marR="0" lvl="0" indent="0" algn="ctr" defTabSz="914400" rtl="0" eaLnBrk="1" fontAlgn="auto" latinLnBrk="0" hangingPunct="1">
+                        <a:lnSpc>
+                          <a:spcPct val="100000"/>
+                        </a:lnSpc>
+                        <a:spcBef>
+                          <a:spcPts val="0"/>
+                        </a:spcBef>
+                        <a:spcAft>
+                          <a:spcPts val="0"/>
+                        </a:spcAft>
+                        <a:buClrTx/>
+                        <a:buSzTx/>
+                        <a:buFontTx/>
+                        <a:buNone/>
+                        <a:tabLst/>
+                        <a:defRPr/>
+                      </a:pPr>
+                      <a:r>
+                        <a:rPr lang="en-GB" sz="1400" dirty="0" err="1"/>
+                        <a:t>XNORNet</a:t>
+                      </a:r>
+                      <a:endParaRPr lang="en-GB" sz="1400" dirty="0"/>
+                    </a:p>
+                  </a:txBody>
+                  <a:tcPr anchor="ctr"/>
+                </a:tc>
+                <a:tc>
+                  <a:txBody>
+                    <a:bodyPr/>
+                    <a:lstStyle/>
+                    <a:p>
+                      <a:pPr algn="ctr"/>
+                      <a:r>
+                        <a:rPr lang="en-GB" sz="1400" dirty="0"/>
+                        <a:t>0.0 </a:t>
+                      </a:r>
+                    </a:p>
+                  </a:txBody>
+                  <a:tcPr anchor="ctr"/>
+                </a:tc>
+                <a:tc>
+                  <a:txBody>
+                    <a:bodyPr/>
+                    <a:lstStyle/>
+                    <a:p>
+                      <a:pPr algn="ctr"/>
+                      <a:r>
+                        <a:rPr lang="en-GB" sz="1400" dirty="0"/>
+                        <a:t>0</a:t>
+                      </a:r>
+                    </a:p>
+                  </a:txBody>
+                  <a:tcPr anchor="ctr"/>
+                </a:tc>
+                <a:tc>
+                  <a:txBody>
+                    <a:bodyPr/>
+                    <a:lstStyle/>
+                    <a:p>
+                      <a:pPr algn="ctr"/>
+                      <a:endParaRPr lang="en-GB" sz="1400" dirty="0"/>
+                    </a:p>
+                  </a:txBody>
+                  <a:tcPr anchor="ctr"/>
+                </a:tc>
+                <a:tc>
+                  <a:txBody>
+                    <a:bodyPr/>
+                    <a:lstStyle/>
+                    <a:p>
+                      <a:pPr algn="ctr"/>
+                      <a:endParaRPr lang="en-GB" sz="1400" dirty="0"/>
+                    </a:p>
+                  </a:txBody>
+                  <a:tcPr anchor="ctr"/>
+                </a:tc>
+                <a:extLst>
+                  <a:ext uri="{0D108BD9-81ED-4DB2-BD59-A6C34878D82A}">
+                    <a16:rowId xmlns:a16="http://schemas.microsoft.com/office/drawing/2014/main" val="2395064945"/>
+                  </a:ext>
+                </a:extLst>
+              </a:tr>
+              <a:tr h="335576">
+                <a:tc>
+                  <a:txBody>
+                    <a:bodyPr/>
+                    <a:lstStyle/>
+                    <a:p>
+                      <a:pPr marL="0" marR="0" lvl="0" indent="0" algn="ctr" defTabSz="914400" rtl="0" eaLnBrk="1" fontAlgn="auto" latinLnBrk="0" hangingPunct="1">
+                        <a:lnSpc>
+                          <a:spcPct val="100000"/>
+                        </a:lnSpc>
+                        <a:spcBef>
+                          <a:spcPts val="0"/>
+                        </a:spcBef>
+                        <a:spcAft>
+                          <a:spcPts val="0"/>
+                        </a:spcAft>
+                        <a:buClrTx/>
+                        <a:buSzTx/>
+                        <a:buFontTx/>
+                        <a:buNone/>
+                        <a:tabLst/>
+                        <a:defRPr/>
+                      </a:pPr>
+                      <a:r>
+                        <a:rPr lang="en-GB" sz="1400" dirty="0"/>
+                        <a:t>Real to Binary</a:t>
+                      </a:r>
+                    </a:p>
+                  </a:txBody>
+                  <a:tcPr anchor="ctr"/>
+                </a:tc>
+                <a:tc>
+                  <a:txBody>
+                    <a:bodyPr/>
+                    <a:lstStyle/>
+                    <a:p>
+                      <a:pPr algn="ctr"/>
+                      <a:r>
+                        <a:rPr lang="en-GB" sz="1400" dirty="0"/>
+                        <a:t>0.0</a:t>
+                      </a:r>
+                    </a:p>
+                  </a:txBody>
+                  <a:tcPr anchor="ctr"/>
+                </a:tc>
+                <a:tc>
+                  <a:txBody>
+                    <a:bodyPr/>
+                    <a:lstStyle/>
+                    <a:p>
+                      <a:pPr algn="ctr"/>
+                      <a:r>
+                        <a:rPr lang="en-GB" sz="1400" dirty="0"/>
+                        <a:t>0</a:t>
+                      </a:r>
+                    </a:p>
+                  </a:txBody>
+                  <a:tcPr anchor="ctr"/>
+                </a:tc>
+                <a:tc>
+                  <a:txBody>
+                    <a:bodyPr/>
+                    <a:lstStyle/>
+                    <a:p>
+                      <a:pPr algn="ctr"/>
+                      <a:endParaRPr lang="en-GB" sz="1400" dirty="0"/>
+                    </a:p>
+                  </a:txBody>
+                  <a:tcPr anchor="ctr"/>
+                </a:tc>
+                <a:tc>
+                  <a:txBody>
+                    <a:bodyPr/>
+                    <a:lstStyle/>
+                    <a:p>
+                      <a:pPr algn="ctr"/>
+                      <a:endParaRPr lang="en-GB" sz="1400" dirty="0"/>
+                    </a:p>
+                  </a:txBody>
+                  <a:tcPr anchor="ctr"/>
+                </a:tc>
+                <a:extLst>
+                  <a:ext uri="{0D108BD9-81ED-4DB2-BD59-A6C34878D82A}">
+                    <a16:rowId xmlns:a16="http://schemas.microsoft.com/office/drawing/2014/main" val="3326120863"/>
+                  </a:ext>
+                </a:extLst>
+              </a:tr>
             </a:tbl>
           </a:graphicData>
         </a:graphic>
@@ -5892,7 +6684,7 @@
 </p:sld>
 </file>
 
-<file path=ppt/slides/slide14.xml><?xml version="1.0" encoding="utf-8"?>
+<file path=ppt/slides/slide15.xml><?xml version="1.0" encoding="utf-8"?>
 <p:sld xmlns:a="http://schemas.openxmlformats.org/drawingml/2006/main" xmlns:r="http://schemas.openxmlformats.org/officeDocument/2006/relationships" xmlns:p="http://schemas.openxmlformats.org/presentationml/2006/main">
   <p:cSld>
     <p:spTree>
@@ -6013,7 +6805,7 @@
             <a:fld id="{62A42E78-4FE3-4E16-9FB9-64A349BFE3FC}" type="slidenum">
               <a:rPr lang="fr-FR" smtClean="0"/>
               <a:pPr/>
-              <a:t>14</a:t>
+              <a:t>15</a:t>
             </a:fld>
             <a:endParaRPr lang="fr-FR" dirty="0"/>
           </a:p>
@@ -6032,7 +6824,7 @@
 </p:sld>
 </file>
 
-<file path=ppt/slides/slide15.xml><?xml version="1.0" encoding="utf-8"?>
+<file path=ppt/slides/slide16.xml><?xml version="1.0" encoding="utf-8"?>
 <p:sld xmlns:a="http://schemas.openxmlformats.org/drawingml/2006/main" xmlns:r="http://schemas.openxmlformats.org/officeDocument/2006/relationships" xmlns:p="http://schemas.openxmlformats.org/presentationml/2006/main">
   <p:cSld>
     <p:spTree>
@@ -8448,7 +9240,7 @@
             </a:r>
             <a:r>
               <a:rPr lang="it-IT" sz="1100" dirty="0"/>
-              <a:t> -&gt; </a:t>
+              <a:t>  </a:t>
             </a:r>
             <a:r>
               <a:rPr lang="it-IT" sz="1100" dirty="0" err="1"/>
@@ -8478,10 +9270,94 @@
               <a:rPr lang="it-IT" sz="1100" dirty="0" err="1"/>
               <a:t>sharing</a:t>
             </a:r>
+            <a:endParaRPr lang="it-IT" sz="1100" dirty="0"/>
+          </a:p>
+          <a:p>
+            <a:pPr lvl="1"/>
+            <a:r>
+              <a:rPr lang="it-IT" sz="1100" b="1" dirty="0" err="1"/>
+              <a:t>XNORNet</a:t>
+            </a:r>
+            <a:r>
+              <a:rPr lang="it-IT" sz="1100" b="1" dirty="0"/>
+              <a:t> </a:t>
+            </a:r>
+            <a:r>
+              <a:rPr lang="it-IT" sz="1100" dirty="0" err="1"/>
+              <a:t>https</a:t>
+            </a:r>
+            <a:r>
+              <a:rPr lang="it-IT" sz="1100" dirty="0"/>
+              <a:t>://</a:t>
+            </a:r>
+            <a:r>
+              <a:rPr lang="it-IT" sz="1100" dirty="0" err="1"/>
+              <a:t>drive.google.com</a:t>
+            </a:r>
+            <a:r>
+              <a:rPr lang="it-IT" sz="1100" dirty="0"/>
+              <a:t>/file/d/1-rDz7bFE0d9LmF1A0RfOfGIguuuuErPp/</a:t>
+            </a:r>
+            <a:r>
+              <a:rPr lang="it-IT" sz="1100" dirty="0" err="1"/>
+              <a:t>view?usp</a:t>
+            </a:r>
+            <a:r>
+              <a:rPr lang="it-IT" sz="1100" dirty="0"/>
+              <a:t>=</a:t>
+            </a:r>
+            <a:r>
+              <a:rPr lang="it-IT" sz="1100" dirty="0" err="1"/>
+              <a:t>sharing</a:t>
+            </a:r>
+            <a:endParaRPr lang="it-IT" sz="1100" dirty="0"/>
+          </a:p>
+          <a:p>
+            <a:pPr lvl="1"/>
+            <a:r>
+              <a:rPr lang="it-IT" sz="1100" b="1" dirty="0"/>
+              <a:t>Real to </a:t>
+            </a:r>
+            <a:r>
+              <a:rPr lang="it-IT" sz="1100" b="1" dirty="0" err="1"/>
+              <a:t>Binary</a:t>
+            </a:r>
+            <a:r>
+              <a:rPr lang="it-IT" sz="1100" b="1" dirty="0"/>
+              <a:t> Net </a:t>
+            </a:r>
+            <a:r>
+              <a:rPr lang="it-IT" sz="1100" dirty="0" err="1"/>
+              <a:t>https</a:t>
+            </a:r>
+            <a:r>
+              <a:rPr lang="it-IT" sz="1100" dirty="0"/>
+              <a:t>://</a:t>
+            </a:r>
+            <a:r>
+              <a:rPr lang="it-IT" sz="1100" dirty="0" err="1"/>
+              <a:t>drive.google.com</a:t>
+            </a:r>
+            <a:r>
+              <a:rPr lang="it-IT" sz="1100" dirty="0"/>
+              <a:t>/file/d/1-rDz7bFE0d9LmF1A0RfOfGIguuuuErPp/</a:t>
+            </a:r>
+            <a:r>
+              <a:rPr lang="it-IT" sz="1100" dirty="0" err="1"/>
+              <a:t>view?usp</a:t>
+            </a:r>
+            <a:r>
+              <a:rPr lang="it-IT" sz="1100" dirty="0"/>
+              <a:t>=</a:t>
+            </a:r>
+            <a:r>
+              <a:rPr lang="it-IT" sz="1100" dirty="0" err="1"/>
+              <a:t>sharing</a:t>
+            </a:r>
             <a:br>
-              <a:rPr lang="it-IT" sz="1100" dirty="0"/>
+              <a:rPr lang="it-IT" sz="1100" b="1" dirty="0"/>
             </a:br>
-            <a:endParaRPr lang="en-GB" sz="1100" dirty="0"/>
+            <a:endParaRPr lang="en-GB" sz="1100" b="1" dirty="0"/>
           </a:p>
         </p:txBody>
       </p:sp>
@@ -10342,6 +11218,15 @@
 </file>
 
 <file path=customXml/item1.xml><?xml version="1.0" encoding="utf-8"?>
+<?mso-contentType ?>
+<FormTemplates xmlns="http://schemas.microsoft.com/sharepoint/v3/contenttype/forms">
+  <Display>DocumentLibraryForm</Display>
+  <Edit>DocumentLibraryForm</Edit>
+  <New>DocumentLibraryForm</New>
+</FormTemplates>
+</file>
+
+<file path=customXml/item2.xml><?xml version="1.0" encoding="utf-8"?>
 <ct:contentTypeSchema xmlns:ct="http://schemas.microsoft.com/office/2006/metadata/contentType" xmlns:ma="http://schemas.microsoft.com/office/2006/metadata/properties/metaAttributes" ct:_="" ma:_="" ma:contentTypeName="Document" ma:contentTypeID="0x0101000A211AD5DA37A9458C2962493D7DC14B" ma:contentTypeVersion="13" ma:contentTypeDescription="Create a new document." ma:contentTypeScope="" ma:versionID="f864bb5674d80d70a838dc29a2d66eef">
   <xsd:schema xmlns:xsd="http://www.w3.org/2001/XMLSchema" xmlns:xs="http://www.w3.org/2001/XMLSchema" xmlns:p="http://schemas.microsoft.com/office/2006/metadata/properties" xmlns:ns3="f3053290-03f5-4abd-a502-4193d9a980c9" xmlns:ns4="109e6646-2a17-4c65-a606-79e019c3d0f9" targetNamespace="http://schemas.microsoft.com/office/2006/metadata/properties" ma:root="true" ma:fieldsID="c090818561f5719306ae599b8a0af89b" ns3:_="" ns4:_="">
     <xsd:import namespace="f3053290-03f5-4abd-a502-4193d9a980c9"/>
@@ -10564,15 +11449,6 @@
 </ct:contentTypeSchema>
 </file>
 
-<file path=customXml/item2.xml><?xml version="1.0" encoding="utf-8"?>
-<?mso-contentType ?>
-<FormTemplates xmlns="http://schemas.microsoft.com/sharepoint/v3/contenttype/forms">
-  <Display>DocumentLibraryForm</Display>
-  <Edit>DocumentLibraryForm</Edit>
-  <New>DocumentLibraryForm</New>
-</FormTemplates>
-</file>
-
 <file path=customXml/item3.xml><?xml version="1.0" encoding="utf-8"?>
 <p:properties xmlns:p="http://schemas.microsoft.com/office/2006/metadata/properties" xmlns:xsi="http://www.w3.org/2001/XMLSchema-instance" xmlns:pc="http://schemas.microsoft.com/office/infopath/2007/PartnerControls">
   <documentManagement/>
@@ -10580,6 +11456,14 @@
 </file>
 
 <file path=customXml/itemProps1.xml><?xml version="1.0" encoding="utf-8"?>
+<ds:datastoreItem xmlns:ds="http://schemas.openxmlformats.org/officeDocument/2006/customXml" ds:itemID="{EF96EF55-315B-4492-B764-01F013E488A1}">
+  <ds:schemaRefs>
+    <ds:schemaRef ds:uri="http://schemas.microsoft.com/sharepoint/v3/contenttype/forms"/>
+  </ds:schemaRefs>
+</ds:datastoreItem>
+</file>
+
+<file path=customXml/itemProps2.xml><?xml version="1.0" encoding="utf-8"?>
 <ds:datastoreItem xmlns:ds="http://schemas.openxmlformats.org/officeDocument/2006/customXml" ds:itemID="{809C4ACF-9EFE-4633-BBA5-B8C4D4C3EE1F}">
   <ds:schemaRefs>
     <ds:schemaRef ds:uri="http://schemas.microsoft.com/office/2006/metadata/contentType"/>
@@ -10594,14 +11478,6 @@
     <ds:schemaRef ds:uri="http://purl.org/dc/elements/1.1/"/>
     <ds:schemaRef ds:uri="http://purl.org/dc/terms/"/>
     <ds:schemaRef ds:uri="http://schemas.microsoft.com/internal/obd"/>
-  </ds:schemaRefs>
-</ds:datastoreItem>
-</file>
-
-<file path=customXml/itemProps2.xml><?xml version="1.0" encoding="utf-8"?>
-<ds:datastoreItem xmlns:ds="http://schemas.openxmlformats.org/officeDocument/2006/customXml" ds:itemID="{EF96EF55-315B-4492-B764-01F013E488A1}">
-  <ds:schemaRefs>
-    <ds:schemaRef ds:uri="http://schemas.microsoft.com/sharepoint/v3/contenttype/forms"/>
   </ds:schemaRefs>
 </ds:datastoreItem>
 </file>

</xml_diff>